<commit_message>
update git password policy
</commit_message>
<xml_diff>
--- a/classes/prog2022/Prog3-Lecture02.pptx
+++ b/classes/prog2022/Prog3-Lecture02.pptx
@@ -19,18 +19,19 @@
     <p:sldId id="291" r:id="rId13"/>
     <p:sldId id="292" r:id="rId14"/>
     <p:sldId id="293" r:id="rId15"/>
-    <p:sldId id="305" r:id="rId16"/>
-    <p:sldId id="294" r:id="rId17"/>
-    <p:sldId id="296" r:id="rId18"/>
-    <p:sldId id="298" r:id="rId19"/>
-    <p:sldId id="295" r:id="rId20"/>
-    <p:sldId id="299" r:id="rId21"/>
-    <p:sldId id="300" r:id="rId22"/>
-    <p:sldId id="301" r:id="rId23"/>
-    <p:sldId id="302" r:id="rId24"/>
-    <p:sldId id="303" r:id="rId25"/>
-    <p:sldId id="304" r:id="rId26"/>
-    <p:sldId id="256" r:id="rId27"/>
+    <p:sldId id="306" r:id="rId16"/>
+    <p:sldId id="305" r:id="rId17"/>
+    <p:sldId id="294" r:id="rId18"/>
+    <p:sldId id="296" r:id="rId19"/>
+    <p:sldId id="298" r:id="rId20"/>
+    <p:sldId id="295" r:id="rId21"/>
+    <p:sldId id="299" r:id="rId22"/>
+    <p:sldId id="300" r:id="rId23"/>
+    <p:sldId id="301" r:id="rId24"/>
+    <p:sldId id="302" r:id="rId25"/>
+    <p:sldId id="303" r:id="rId26"/>
+    <p:sldId id="304" r:id="rId27"/>
+    <p:sldId id="256" r:id="rId28"/>
   </p:sldIdLst>
   <p:sldSz cx="12192000" cy="6858000"/>
   <p:notesSz cx="6858000" cy="9144000"/>
@@ -284,7 +285,7 @@
           <a:p>
             <a:fld id="{203031E0-4856-4DE4-BAFF-0FAAB821BF2D}" type="datetimeFigureOut">
               <a:rPr lang="en-US" smtClean="0"/>
-              <a:t>8/24/2021</a:t>
+              <a:t>8/24/2022</a:t>
             </a:fld>
             <a:endParaRPr lang="en-US"/>
           </a:p>
@@ -482,7 +483,7 @@
           <a:p>
             <a:fld id="{203031E0-4856-4DE4-BAFF-0FAAB821BF2D}" type="datetimeFigureOut">
               <a:rPr lang="en-US" smtClean="0"/>
-              <a:t>8/24/2021</a:t>
+              <a:t>8/24/2022</a:t>
             </a:fld>
             <a:endParaRPr lang="en-US"/>
           </a:p>
@@ -690,7 +691,7 @@
           <a:p>
             <a:fld id="{203031E0-4856-4DE4-BAFF-0FAAB821BF2D}" type="datetimeFigureOut">
               <a:rPr lang="en-US" smtClean="0"/>
-              <a:t>8/24/2021</a:t>
+              <a:t>8/24/2022</a:t>
             </a:fld>
             <a:endParaRPr lang="en-US"/>
           </a:p>
@@ -888,7 +889,7 @@
           <a:p>
             <a:fld id="{203031E0-4856-4DE4-BAFF-0FAAB821BF2D}" type="datetimeFigureOut">
               <a:rPr lang="en-US" smtClean="0"/>
-              <a:t>8/24/2021</a:t>
+              <a:t>8/24/2022</a:t>
             </a:fld>
             <a:endParaRPr lang="en-US"/>
           </a:p>
@@ -1163,7 +1164,7 @@
           <a:p>
             <a:fld id="{203031E0-4856-4DE4-BAFF-0FAAB821BF2D}" type="datetimeFigureOut">
               <a:rPr lang="en-US" smtClean="0"/>
-              <a:t>8/24/2021</a:t>
+              <a:t>8/24/2022</a:t>
             </a:fld>
             <a:endParaRPr lang="en-US"/>
           </a:p>
@@ -1428,7 +1429,7 @@
           <a:p>
             <a:fld id="{203031E0-4856-4DE4-BAFF-0FAAB821BF2D}" type="datetimeFigureOut">
               <a:rPr lang="en-US" smtClean="0"/>
-              <a:t>8/24/2021</a:t>
+              <a:t>8/24/2022</a:t>
             </a:fld>
             <a:endParaRPr lang="en-US"/>
           </a:p>
@@ -1840,7 +1841,7 @@
           <a:p>
             <a:fld id="{203031E0-4856-4DE4-BAFF-0FAAB821BF2D}" type="datetimeFigureOut">
               <a:rPr lang="en-US" smtClean="0"/>
-              <a:t>8/24/2021</a:t>
+              <a:t>8/24/2022</a:t>
             </a:fld>
             <a:endParaRPr lang="en-US"/>
           </a:p>
@@ -1981,7 +1982,7 @@
           <a:p>
             <a:fld id="{203031E0-4856-4DE4-BAFF-0FAAB821BF2D}" type="datetimeFigureOut">
               <a:rPr lang="en-US" smtClean="0"/>
-              <a:t>8/24/2021</a:t>
+              <a:t>8/24/2022</a:t>
             </a:fld>
             <a:endParaRPr lang="en-US"/>
           </a:p>
@@ -2094,7 +2095,7 @@
           <a:p>
             <a:fld id="{203031E0-4856-4DE4-BAFF-0FAAB821BF2D}" type="datetimeFigureOut">
               <a:rPr lang="en-US" smtClean="0"/>
-              <a:t>8/24/2021</a:t>
+              <a:t>8/24/2022</a:t>
             </a:fld>
             <a:endParaRPr lang="en-US"/>
           </a:p>
@@ -2405,7 +2406,7 @@
           <a:p>
             <a:fld id="{203031E0-4856-4DE4-BAFF-0FAAB821BF2D}" type="datetimeFigureOut">
               <a:rPr lang="en-US" smtClean="0"/>
-              <a:t>8/24/2021</a:t>
+              <a:t>8/24/2022</a:t>
             </a:fld>
             <a:endParaRPr lang="en-US"/>
           </a:p>
@@ -2693,7 +2694,7 @@
           <a:p>
             <a:fld id="{203031E0-4856-4DE4-BAFF-0FAAB821BF2D}" type="datetimeFigureOut">
               <a:rPr lang="en-US" smtClean="0"/>
-              <a:t>8/24/2021</a:t>
+              <a:t>8/24/2022</a:t>
             </a:fld>
             <a:endParaRPr lang="en-US"/>
           </a:p>
@@ -2934,7 +2935,7 @@
           <a:p>
             <a:fld id="{203031E0-4856-4DE4-BAFF-0FAAB821BF2D}" type="datetimeFigureOut">
               <a:rPr lang="en-US" smtClean="0"/>
-              <a:t>8/24/2021</a:t>
+              <a:t>8/24/2022</a:t>
             </a:fld>
             <a:endParaRPr lang="en-US"/>
           </a:p>
@@ -4279,7 +4280,7 @@
           <p:cNvPr id="4" name="TextBox 3">
             <a:extLst>
               <a:ext uri="{FF2B5EF4-FFF2-40B4-BE49-F238E27FC236}">
-                <a16:creationId xmlns:a16="http://schemas.microsoft.com/office/drawing/2014/main" id="{0E42A304-53A0-49F3-BBDB-C0C383FEE68B}"/>
+                <a16:creationId xmlns:a16="http://schemas.microsoft.com/office/drawing/2014/main" id="{2FC2BF11-BA4A-18C6-7E04-ED42034D3BC0}"/>
               </a:ext>
             </a:extLst>
           </p:cNvPr>
@@ -4288,8 +4289,8 @@
         </p:nvSpPr>
         <p:spPr>
           <a:xfrm>
-            <a:off x="914400" y="541538"/>
-            <a:ext cx="7417480" cy="2308324"/>
+            <a:off x="810491" y="361604"/>
+            <a:ext cx="9108456" cy="1200329"/>
           </a:xfrm>
           <a:prstGeom prst="rect">
             <a:avLst/>
@@ -4307,7 +4308,7 @@
                 <a:latin typeface="Arial" panose="020B0604020202020204" pitchFamily="34" charset="0"/>
                 <a:cs typeface="Arial" panose="020B0604020202020204" pitchFamily="34" charset="0"/>
               </a:rPr>
-              <a:t>After October 2020, the default branch will be “main” instead of master.</a:t>
+              <a:t>A further complication is that your password is not your password from the website.</a:t>
             </a:r>
           </a:p>
           <a:p>
@@ -4316,7 +4317,7 @@
                 <a:latin typeface="Arial" panose="020B0604020202020204" pitchFamily="34" charset="0"/>
                 <a:cs typeface="Arial" panose="020B0604020202020204" pitchFamily="34" charset="0"/>
               </a:rPr>
-              <a:t>So for new repositories, the command is</a:t>
+              <a:t>You have to generate a “temporary” password (or “token”) from the website…</a:t>
             </a:r>
           </a:p>
           <a:p>
@@ -4331,7 +4332,221 @@
                 <a:latin typeface="Arial" panose="020B0604020202020204" pitchFamily="34" charset="0"/>
                 <a:cs typeface="Arial" panose="020B0604020202020204" pitchFamily="34" charset="0"/>
               </a:rPr>
-              <a:t>git push origin main</a:t>
+              <a:t>Go to settings-&gt; Developer Settings -&gt;Personal Access Tokens -&gt; Generate New Token</a:t>
+            </a:r>
+          </a:p>
+        </p:txBody>
+      </p:sp>
+      <p:graphicFrame>
+        <p:nvGraphicFramePr>
+          <p:cNvPr id="5" name="Object 4">
+            <a:extLst>
+              <a:ext uri="{FF2B5EF4-FFF2-40B4-BE49-F238E27FC236}">
+                <a16:creationId xmlns:a16="http://schemas.microsoft.com/office/drawing/2014/main" id="{4EE34235-F279-F4F6-8AAE-5528E6C36E22}"/>
+              </a:ext>
+            </a:extLst>
+          </p:cNvPr>
+          <p:cNvGraphicFramePr>
+            <a:graphicFrameLocks noChangeAspect="1"/>
+          </p:cNvGraphicFramePr>
+          <p:nvPr>
+            <p:extLst>
+              <p:ext uri="{D42A27DB-BD31-4B8C-83A1-F6EECF244321}">
+                <p14:modId xmlns:p14="http://schemas.microsoft.com/office/powerpoint/2010/main" val="2379664258"/>
+              </p:ext>
+            </p:extLst>
+          </p:nvPr>
+        </p:nvGraphicFramePr>
+        <p:xfrm>
+          <a:off x="1675553" y="1513635"/>
+          <a:ext cx="7559126" cy="4410725"/>
+        </p:xfrm>
+        <a:graphic>
+          <a:graphicData uri="http://schemas.openxmlformats.org/presentationml/2006/ole">
+            <mc:AlternateContent xmlns:mc="http://schemas.openxmlformats.org/markup-compatibility/2006">
+              <mc:Choice xmlns:v="urn:schemas-microsoft-com:vml" Requires="v">
+                <p:oleObj name="Bitmap Image" r:id="rId2" imgW="8907840" imgH="5196960" progId="PBrush">
+                  <p:embed/>
+                </p:oleObj>
+              </mc:Choice>
+              <mc:Fallback>
+                <p:oleObj name="Bitmap Image" r:id="rId2" imgW="8907840" imgH="5196960" progId="PBrush">
+                  <p:embed/>
+                  <p:pic>
+                    <p:nvPicPr>
+                      <p:cNvPr id="0" name=""/>
+                      <p:cNvPicPr/>
+                      <p:nvPr/>
+                    </p:nvPicPr>
+                    <p:blipFill>
+                      <a:blip r:embed="rId3"/>
+                      <a:stretch>
+                        <a:fillRect/>
+                      </a:stretch>
+                    </p:blipFill>
+                    <p:spPr>
+                      <a:xfrm>
+                        <a:off x="1675553" y="1513635"/>
+                        <a:ext cx="7559126" cy="4410725"/>
+                      </a:xfrm>
+                      <a:prstGeom prst="rect">
+                        <a:avLst/>
+                      </a:prstGeom>
+                    </p:spPr>
+                  </p:pic>
+                </p:oleObj>
+              </mc:Fallback>
+            </mc:AlternateContent>
+          </a:graphicData>
+        </a:graphic>
+      </p:graphicFrame>
+      <p:cxnSp>
+        <p:nvCxnSpPr>
+          <p:cNvPr id="7" name="Straight Arrow Connector 6">
+            <a:extLst>
+              <a:ext uri="{FF2B5EF4-FFF2-40B4-BE49-F238E27FC236}">
+                <a16:creationId xmlns:a16="http://schemas.microsoft.com/office/drawing/2014/main" id="{ACF249D3-4256-C1A2-4016-BF5A14049FDF}"/>
+              </a:ext>
+            </a:extLst>
+          </p:cNvPr>
+          <p:cNvCxnSpPr/>
+          <p:nvPr/>
+        </p:nvCxnSpPr>
+        <p:spPr>
+          <a:xfrm>
+            <a:off x="1109748" y="4513811"/>
+            <a:ext cx="677487" cy="444731"/>
+          </a:xfrm>
+          <a:prstGeom prst="straightConnector1">
+            <a:avLst/>
+          </a:prstGeom>
+          <a:ln>
+            <a:tailEnd type="triangle"/>
+          </a:ln>
+        </p:spPr>
+        <p:style>
+          <a:lnRef idx="1">
+            <a:schemeClr val="accent1"/>
+          </a:lnRef>
+          <a:fillRef idx="0">
+            <a:schemeClr val="accent1"/>
+          </a:fillRef>
+          <a:effectRef idx="0">
+            <a:schemeClr val="accent1"/>
+          </a:effectRef>
+          <a:fontRef idx="minor">
+            <a:schemeClr val="tx1"/>
+          </a:fontRef>
+        </p:style>
+      </p:cxnSp>
+      <p:sp>
+        <p:nvSpPr>
+          <p:cNvPr id="8" name="TextBox 7">
+            <a:extLst>
+              <a:ext uri="{FF2B5EF4-FFF2-40B4-BE49-F238E27FC236}">
+                <a16:creationId xmlns:a16="http://schemas.microsoft.com/office/drawing/2014/main" id="{D31A9AAE-33A4-540F-399F-ECFC5CE6B3B2}"/>
+              </a:ext>
+            </a:extLst>
+          </p:cNvPr>
+          <p:cNvSpPr txBox="1"/>
+          <p:nvPr/>
+        </p:nvSpPr>
+        <p:spPr>
+          <a:xfrm>
+            <a:off x="0" y="4206132"/>
+            <a:ext cx="1505540" cy="923330"/>
+          </a:xfrm>
+          <a:prstGeom prst="rect">
+            <a:avLst/>
+          </a:prstGeom>
+          <a:noFill/>
+        </p:spPr>
+        <p:txBody>
+          <a:bodyPr wrap="none" rtlCol="0">
+            <a:spAutoFit/>
+          </a:bodyPr>
+          <a:lstStyle/>
+          <a:p>
+            <a:r>
+              <a:rPr lang="en-US" dirty="0">
+                <a:latin typeface="Arial" panose="020B0604020202020204" pitchFamily="34" charset="0"/>
+                <a:cs typeface="Arial" panose="020B0604020202020204" pitchFamily="34" charset="0"/>
+              </a:rPr>
+              <a:t>I usually</a:t>
+            </a:r>
+          </a:p>
+          <a:p>
+            <a:r>
+              <a:rPr lang="en-US" dirty="0">
+                <a:latin typeface="Arial" panose="020B0604020202020204" pitchFamily="34" charset="0"/>
+                <a:cs typeface="Arial" panose="020B0604020202020204" pitchFamily="34" charset="0"/>
+              </a:rPr>
+              <a:t>just  click</a:t>
+            </a:r>
+          </a:p>
+          <a:p>
+            <a:r>
+              <a:rPr lang="en-US" dirty="0">
+                <a:latin typeface="Arial" panose="020B0604020202020204" pitchFamily="34" charset="0"/>
+                <a:cs typeface="Arial" panose="020B0604020202020204" pitchFamily="34" charset="0"/>
+              </a:rPr>
+              <a:t>everything…</a:t>
+            </a:r>
+          </a:p>
+        </p:txBody>
+      </p:sp>
+      <p:sp>
+        <p:nvSpPr>
+          <p:cNvPr id="9" name="TextBox 8">
+            <a:extLst>
+              <a:ext uri="{FF2B5EF4-FFF2-40B4-BE49-F238E27FC236}">
+                <a16:creationId xmlns:a16="http://schemas.microsoft.com/office/drawing/2014/main" id="{AAB04F17-DF90-6C2F-028C-AB4A2C321512}"/>
+              </a:ext>
+            </a:extLst>
+          </p:cNvPr>
+          <p:cNvSpPr txBox="1"/>
+          <p:nvPr/>
+        </p:nvSpPr>
+        <p:spPr>
+          <a:xfrm>
+            <a:off x="8458200" y="1882833"/>
+            <a:ext cx="2319251" cy="1477328"/>
+          </a:xfrm>
+          <a:prstGeom prst="rect">
+            <a:avLst/>
+          </a:prstGeom>
+          <a:noFill/>
+        </p:spPr>
+        <p:txBody>
+          <a:bodyPr wrap="square" rtlCol="0">
+            <a:spAutoFit/>
+          </a:bodyPr>
+          <a:lstStyle/>
+          <a:p>
+            <a:r>
+              <a:rPr lang="en-US" dirty="0">
+                <a:latin typeface="Arial" panose="020B0604020202020204" pitchFamily="34" charset="0"/>
+                <a:cs typeface="Arial" panose="020B0604020202020204" pitchFamily="34" charset="0"/>
+              </a:rPr>
+              <a:t>This is a bit</a:t>
+            </a:r>
+          </a:p>
+          <a:p>
+            <a:r>
+              <a:rPr lang="en-US" dirty="0">
+                <a:latin typeface="Arial" panose="020B0604020202020204" pitchFamily="34" charset="0"/>
+                <a:cs typeface="Arial" panose="020B0604020202020204" pitchFamily="34" charset="0"/>
+              </a:rPr>
+              <a:t>tedious from </a:t>
+            </a:r>
+          </a:p>
+          <a:p>
+            <a:r>
+              <a:rPr lang="en-US" dirty="0">
+                <a:latin typeface="Arial" panose="020B0604020202020204" pitchFamily="34" charset="0"/>
+                <a:cs typeface="Arial" panose="020B0604020202020204" pitchFamily="34" charset="0"/>
+              </a:rPr>
+              <a:t>the command line</a:t>
             </a:r>
           </a:p>
           <a:p>
@@ -4341,27 +4556,117 @@
             </a:endParaRPr>
           </a:p>
           <a:p>
-            <a:r>
-              <a:rPr lang="en-US" dirty="0">
-                <a:latin typeface="Arial" panose="020B0604020202020204" pitchFamily="34" charset="0"/>
-                <a:cs typeface="Arial" panose="020B0604020202020204" pitchFamily="34" charset="0"/>
-              </a:rPr>
-              <a:t>For older repositories:</a:t>
-            </a:r>
-          </a:p>
-          <a:p>
             <a:endParaRPr lang="en-US" dirty="0">
               <a:latin typeface="Arial" panose="020B0604020202020204" pitchFamily="34" charset="0"/>
               <a:cs typeface="Arial" panose="020B0604020202020204" pitchFamily="34" charset="0"/>
             </a:endParaRPr>
           </a:p>
-          <a:p>
-            <a:r>
-              <a:rPr lang="en-US" dirty="0">
-                <a:latin typeface="Arial" panose="020B0604020202020204" pitchFamily="34" charset="0"/>
-                <a:cs typeface="Arial" panose="020B0604020202020204" pitchFamily="34" charset="0"/>
-              </a:rPr>
-              <a:t>git push origin master</a:t>
+        </p:txBody>
+      </p:sp>
+      <p:sp>
+        <p:nvSpPr>
+          <p:cNvPr id="10" name="TextBox 9">
+            <a:extLst>
+              <a:ext uri="{FF2B5EF4-FFF2-40B4-BE49-F238E27FC236}">
+                <a16:creationId xmlns:a16="http://schemas.microsoft.com/office/drawing/2014/main" id="{356FC305-1C45-6D04-3CD8-9D1850C08236}"/>
+              </a:ext>
+            </a:extLst>
+          </p:cNvPr>
+          <p:cNvSpPr txBox="1"/>
+          <p:nvPr/>
+        </p:nvSpPr>
+        <p:spPr>
+          <a:xfrm>
+            <a:off x="8062861" y="3852148"/>
+            <a:ext cx="4181145" cy="2031325"/>
+          </a:xfrm>
+          <a:prstGeom prst="rect">
+            <a:avLst/>
+          </a:prstGeom>
+          <a:noFill/>
+        </p:spPr>
+        <p:txBody>
+          <a:bodyPr wrap="none" rtlCol="0">
+            <a:spAutoFit/>
+          </a:bodyPr>
+          <a:lstStyle/>
+          <a:p>
+            <a:r>
+              <a:rPr lang="en-US" dirty="0"/>
+              <a:t>If you use </a:t>
+            </a:r>
+          </a:p>
+          <a:p>
+            <a:r>
+              <a:rPr lang="en-US" dirty="0"/>
+              <a:t>“git config --global </a:t>
+            </a:r>
+            <a:r>
+              <a:rPr lang="en-US" dirty="0" err="1"/>
+              <a:t>credential.helper</a:t>
+            </a:r>
+            <a:r>
+              <a:rPr lang="en-US" dirty="0"/>
+              <a:t> store”</a:t>
+            </a:r>
+          </a:p>
+          <a:p>
+            <a:endParaRPr lang="en-US" dirty="0"/>
+          </a:p>
+          <a:p>
+            <a:r>
+              <a:rPr lang="en-US" dirty="0"/>
+              <a:t>you won’t have to keep reentering</a:t>
+            </a:r>
+          </a:p>
+          <a:p>
+            <a:r>
+              <a:rPr lang="en-US" dirty="0"/>
+              <a:t>the password but this stores your </a:t>
+            </a:r>
+          </a:p>
+          <a:p>
+            <a:r>
+              <a:rPr lang="en-US" dirty="0"/>
+              <a:t>password in plain text.</a:t>
+            </a:r>
+          </a:p>
+          <a:p>
+            <a:endParaRPr lang="en-US" dirty="0"/>
+          </a:p>
+        </p:txBody>
+      </p:sp>
+      <p:sp>
+        <p:nvSpPr>
+          <p:cNvPr id="12" name="TextBox 11">
+            <a:extLst>
+              <a:ext uri="{FF2B5EF4-FFF2-40B4-BE49-F238E27FC236}">
+                <a16:creationId xmlns:a16="http://schemas.microsoft.com/office/drawing/2014/main" id="{F2AD420C-7585-571D-5C62-871D2C2D548F}"/>
+              </a:ext>
+            </a:extLst>
+          </p:cNvPr>
+          <p:cNvSpPr txBox="1"/>
+          <p:nvPr/>
+        </p:nvSpPr>
+        <p:spPr>
+          <a:xfrm>
+            <a:off x="5455116" y="5924360"/>
+            <a:ext cx="6149340" cy="646331"/>
+          </a:xfrm>
+          <a:prstGeom prst="rect">
+            <a:avLst/>
+          </a:prstGeom>
+          <a:noFill/>
+        </p:spPr>
+        <p:txBody>
+          <a:bodyPr wrap="square">
+            <a:spAutoFit/>
+          </a:bodyPr>
+          <a:lstStyle/>
+          <a:p>
+            <a:r>
+              <a:rPr lang="en-US" dirty="0"/>
+              <a:t>See https://stackoverflow.com/questions/35942754/how-can-i-save-username-and-password-in-git</a:t>
             </a:r>
           </a:p>
         </p:txBody>
@@ -4369,7 +4674,7 @@
     </p:spTree>
     <p:extLst>
       <p:ext uri="{BB962C8B-B14F-4D97-AF65-F5344CB8AC3E}">
-        <p14:creationId xmlns:p14="http://schemas.microsoft.com/office/powerpoint/2010/main" val="1461651643"/>
+        <p14:creationId xmlns:p14="http://schemas.microsoft.com/office/powerpoint/2010/main" val="1982453980"/>
       </p:ext>
     </p:extLst>
   </p:cSld>
@@ -4396,42 +4701,12 @@
           <a:chExt cx="0" cy="0"/>
         </a:xfrm>
       </p:grpSpPr>
-      <p:pic>
-        <p:nvPicPr>
-          <p:cNvPr id="4" name="Picture 3">
-            <a:extLst>
-              <a:ext uri="{FF2B5EF4-FFF2-40B4-BE49-F238E27FC236}">
-                <a16:creationId xmlns:a16="http://schemas.microsoft.com/office/drawing/2014/main" id="{577BC04F-FADA-4501-B14C-2EE4D053CD32}"/>
-              </a:ext>
-            </a:extLst>
-          </p:cNvPr>
-          <p:cNvPicPr>
-            <a:picLocks noChangeAspect="1"/>
-          </p:cNvPicPr>
-          <p:nvPr/>
-        </p:nvPicPr>
-        <p:blipFill>
-          <a:blip r:embed="rId2"/>
-          <a:stretch>
-            <a:fillRect/>
-          </a:stretch>
-        </p:blipFill>
-        <p:spPr>
-          <a:xfrm>
-            <a:off x="782799" y="993124"/>
-            <a:ext cx="8971914" cy="5680180"/>
-          </a:xfrm>
-          <a:prstGeom prst="rect">
-            <a:avLst/>
-          </a:prstGeom>
-        </p:spPr>
-      </p:pic>
-      <p:sp>
-        <p:nvSpPr>
-          <p:cNvPr id="6" name="TextBox 5">
-            <a:extLst>
-              <a:ext uri="{FF2B5EF4-FFF2-40B4-BE49-F238E27FC236}">
-                <a16:creationId xmlns:a16="http://schemas.microsoft.com/office/drawing/2014/main" id="{E979077B-5471-40BA-927F-3136AFB3035E}"/>
+      <p:sp>
+        <p:nvSpPr>
+          <p:cNvPr id="4" name="TextBox 3">
+            <a:extLst>
+              <a:ext uri="{FF2B5EF4-FFF2-40B4-BE49-F238E27FC236}">
+                <a16:creationId xmlns:a16="http://schemas.microsoft.com/office/drawing/2014/main" id="{0E42A304-53A0-49F3-BBDB-C0C383FEE68B}"/>
               </a:ext>
             </a:extLst>
           </p:cNvPr>
@@ -4440,8 +4715,8 @@
         </p:nvSpPr>
         <p:spPr>
           <a:xfrm>
-            <a:off x="968898" y="339115"/>
-            <a:ext cx="10456709" cy="369332"/>
+            <a:off x="914400" y="541538"/>
+            <a:ext cx="7417480" cy="2308324"/>
           </a:xfrm>
           <a:prstGeom prst="rect">
             <a:avLst/>
@@ -4459,21 +4734,61 @@
                 <a:latin typeface="Arial" panose="020B0604020202020204" pitchFamily="34" charset="0"/>
                 <a:cs typeface="Arial" panose="020B0604020202020204" pitchFamily="34" charset="0"/>
               </a:rPr>
-              <a:t>Our changes are now visible at </a:t>
-            </a:r>
-            <a:r>
-              <a:rPr lang="en-US" dirty="0" err="1">
-                <a:latin typeface="Arial" panose="020B0604020202020204" pitchFamily="34" charset="0"/>
-                <a:cs typeface="Arial" panose="020B0604020202020204" pitchFamily="34" charset="0"/>
-              </a:rPr>
-              <a:t>github</a:t>
-            </a:r>
+              <a:t>After October 2020, the default branch will be “main” instead of master.</a:t>
+            </a:r>
+          </a:p>
+          <a:p>
             <a:r>
               <a:rPr lang="en-US" dirty="0">
                 <a:latin typeface="Arial" panose="020B0604020202020204" pitchFamily="34" charset="0"/>
                 <a:cs typeface="Arial" panose="020B0604020202020204" pitchFamily="34" charset="0"/>
               </a:rPr>
-              <a:t> (where the world can see them since this is a public repository)</a:t>
+              <a:t>So for new repositories, the command is</a:t>
+            </a:r>
+          </a:p>
+          <a:p>
+            <a:endParaRPr lang="en-US" dirty="0">
+              <a:latin typeface="Arial" panose="020B0604020202020204" pitchFamily="34" charset="0"/>
+              <a:cs typeface="Arial" panose="020B0604020202020204" pitchFamily="34" charset="0"/>
+            </a:endParaRPr>
+          </a:p>
+          <a:p>
+            <a:r>
+              <a:rPr lang="en-US" dirty="0">
+                <a:latin typeface="Arial" panose="020B0604020202020204" pitchFamily="34" charset="0"/>
+                <a:cs typeface="Arial" panose="020B0604020202020204" pitchFamily="34" charset="0"/>
+              </a:rPr>
+              <a:t>git push origin main</a:t>
+            </a:r>
+          </a:p>
+          <a:p>
+            <a:endParaRPr lang="en-US" dirty="0">
+              <a:latin typeface="Arial" panose="020B0604020202020204" pitchFamily="34" charset="0"/>
+              <a:cs typeface="Arial" panose="020B0604020202020204" pitchFamily="34" charset="0"/>
+            </a:endParaRPr>
+          </a:p>
+          <a:p>
+            <a:r>
+              <a:rPr lang="en-US" dirty="0">
+                <a:latin typeface="Arial" panose="020B0604020202020204" pitchFamily="34" charset="0"/>
+                <a:cs typeface="Arial" panose="020B0604020202020204" pitchFamily="34" charset="0"/>
+              </a:rPr>
+              <a:t>For older repositories:</a:t>
+            </a:r>
+          </a:p>
+          <a:p>
+            <a:endParaRPr lang="en-US" dirty="0">
+              <a:latin typeface="Arial" panose="020B0604020202020204" pitchFamily="34" charset="0"/>
+              <a:cs typeface="Arial" panose="020B0604020202020204" pitchFamily="34" charset="0"/>
+            </a:endParaRPr>
+          </a:p>
+          <a:p>
+            <a:r>
+              <a:rPr lang="en-US" dirty="0">
+                <a:latin typeface="Arial" panose="020B0604020202020204" pitchFamily="34" charset="0"/>
+                <a:cs typeface="Arial" panose="020B0604020202020204" pitchFamily="34" charset="0"/>
+              </a:rPr>
+              <a:t>git push origin master</a:t>
             </a:r>
           </a:p>
         </p:txBody>
@@ -4481,7 +4796,7 @@
     </p:spTree>
     <p:extLst>
       <p:ext uri="{BB962C8B-B14F-4D97-AF65-F5344CB8AC3E}">
-        <p14:creationId xmlns:p14="http://schemas.microsoft.com/office/powerpoint/2010/main" val="3251464963"/>
+        <p14:creationId xmlns:p14="http://schemas.microsoft.com/office/powerpoint/2010/main" val="1461651643"/>
       </p:ext>
     </p:extLst>
   </p:cSld>
@@ -4508,53 +4823,12 @@
           <a:chExt cx="0" cy="0"/>
         </a:xfrm>
       </p:grpSpPr>
-      <p:sp>
-        <p:nvSpPr>
-          <p:cNvPr id="4" name="TextBox 3">
-            <a:extLst>
-              <a:ext uri="{FF2B5EF4-FFF2-40B4-BE49-F238E27FC236}">
-                <a16:creationId xmlns:a16="http://schemas.microsoft.com/office/drawing/2014/main" id="{7ACEA824-4275-423E-B29E-68999C559143}"/>
-              </a:ext>
-            </a:extLst>
-          </p:cNvPr>
-          <p:cNvSpPr txBox="1"/>
-          <p:nvPr/>
-        </p:nvSpPr>
-        <p:spPr>
-          <a:xfrm>
-            <a:off x="508673" y="90835"/>
-            <a:ext cx="10912731" cy="646331"/>
-          </a:xfrm>
-          <a:prstGeom prst="rect">
-            <a:avLst/>
-          </a:prstGeom>
-          <a:noFill/>
-        </p:spPr>
-        <p:txBody>
-          <a:bodyPr wrap="none" rtlCol="0">
-            <a:spAutoFit/>
-          </a:bodyPr>
-          <a:lstStyle/>
-          <a:p>
-            <a:r>
-              <a:rPr lang="en-US" dirty="0"/>
-              <a:t>git log will give us a history of our commits and git diff allows us to compare the current checkout commit with any</a:t>
-            </a:r>
-          </a:p>
-          <a:p>
-            <a:r>
-              <a:rPr lang="en-US" dirty="0"/>
-              <a:t>other commit…</a:t>
-            </a:r>
-          </a:p>
-        </p:txBody>
-      </p:sp>
       <p:pic>
         <p:nvPicPr>
-          <p:cNvPr id="5" name="Picture 4">
-            <a:extLst>
-              <a:ext uri="{FF2B5EF4-FFF2-40B4-BE49-F238E27FC236}">
-                <a16:creationId xmlns:a16="http://schemas.microsoft.com/office/drawing/2014/main" id="{0CB0D549-C2D3-4F69-AEC5-F2BD6E428BA9}"/>
+          <p:cNvPr id="4" name="Picture 3">
+            <a:extLst>
+              <a:ext uri="{FF2B5EF4-FFF2-40B4-BE49-F238E27FC236}">
+                <a16:creationId xmlns:a16="http://schemas.microsoft.com/office/drawing/2014/main" id="{577BC04F-FADA-4501-B14C-2EE4D053CD32}"/>
               </a:ext>
             </a:extLst>
           </p:cNvPr>
@@ -4571,48 +4845,70 @@
         </p:blipFill>
         <p:spPr>
           <a:xfrm>
-            <a:off x="714563" y="718998"/>
-            <a:ext cx="8947396" cy="3415603"/>
+            <a:off x="782799" y="993124"/>
+            <a:ext cx="8971914" cy="5680180"/>
           </a:xfrm>
           <a:prstGeom prst="rect">
             <a:avLst/>
           </a:prstGeom>
         </p:spPr>
       </p:pic>
-      <p:pic>
-        <p:nvPicPr>
-          <p:cNvPr id="6" name="Picture 5">
-            <a:extLst>
-              <a:ext uri="{FF2B5EF4-FFF2-40B4-BE49-F238E27FC236}">
-                <a16:creationId xmlns:a16="http://schemas.microsoft.com/office/drawing/2014/main" id="{AB2F2C3B-E07E-477A-BD0F-F29D4157F67E}"/>
-              </a:ext>
-            </a:extLst>
-          </p:cNvPr>
-          <p:cNvPicPr>
-            <a:picLocks noChangeAspect="1"/>
-          </p:cNvPicPr>
-          <p:nvPr/>
-        </p:nvPicPr>
-        <p:blipFill>
-          <a:blip r:embed="rId3"/>
-          <a:stretch>
-            <a:fillRect/>
-          </a:stretch>
-        </p:blipFill>
-        <p:spPr>
-          <a:xfrm>
-            <a:off x="1943857" y="4158825"/>
-            <a:ext cx="7811952" cy="2667258"/>
+      <p:sp>
+        <p:nvSpPr>
+          <p:cNvPr id="6" name="TextBox 5">
+            <a:extLst>
+              <a:ext uri="{FF2B5EF4-FFF2-40B4-BE49-F238E27FC236}">
+                <a16:creationId xmlns:a16="http://schemas.microsoft.com/office/drawing/2014/main" id="{E979077B-5471-40BA-927F-3136AFB3035E}"/>
+              </a:ext>
+            </a:extLst>
+          </p:cNvPr>
+          <p:cNvSpPr txBox="1"/>
+          <p:nvPr/>
+        </p:nvSpPr>
+        <p:spPr>
+          <a:xfrm>
+            <a:off x="968898" y="339115"/>
+            <a:ext cx="10456709" cy="369332"/>
           </a:xfrm>
           <a:prstGeom prst="rect">
             <a:avLst/>
           </a:prstGeom>
-        </p:spPr>
-      </p:pic>
+          <a:noFill/>
+        </p:spPr>
+        <p:txBody>
+          <a:bodyPr wrap="none" rtlCol="0">
+            <a:spAutoFit/>
+          </a:bodyPr>
+          <a:lstStyle/>
+          <a:p>
+            <a:r>
+              <a:rPr lang="en-US" dirty="0">
+                <a:latin typeface="Arial" panose="020B0604020202020204" pitchFamily="34" charset="0"/>
+                <a:cs typeface="Arial" panose="020B0604020202020204" pitchFamily="34" charset="0"/>
+              </a:rPr>
+              <a:t>Our changes are now visible at </a:t>
+            </a:r>
+            <a:r>
+              <a:rPr lang="en-US" dirty="0" err="1">
+                <a:latin typeface="Arial" panose="020B0604020202020204" pitchFamily="34" charset="0"/>
+                <a:cs typeface="Arial" panose="020B0604020202020204" pitchFamily="34" charset="0"/>
+              </a:rPr>
+              <a:t>github</a:t>
+            </a:r>
+            <a:r>
+              <a:rPr lang="en-US" dirty="0">
+                <a:latin typeface="Arial" panose="020B0604020202020204" pitchFamily="34" charset="0"/>
+                <a:cs typeface="Arial" panose="020B0604020202020204" pitchFamily="34" charset="0"/>
+              </a:rPr>
+              <a:t> (where the world can see them since this is a public repository)</a:t>
+            </a:r>
+          </a:p>
+        </p:txBody>
+      </p:sp>
     </p:spTree>
     <p:extLst>
       <p:ext uri="{BB962C8B-B14F-4D97-AF65-F5344CB8AC3E}">
-        <p14:creationId xmlns:p14="http://schemas.microsoft.com/office/powerpoint/2010/main" val="2131626001"/>
+        <p14:creationId xmlns:p14="http://schemas.microsoft.com/office/powerpoint/2010/main" val="3251464963"/>
       </p:ext>
     </p:extLst>
   </p:cSld>
@@ -4639,77 +4935,111 @@
           <a:chExt cx="0" cy="0"/>
         </a:xfrm>
       </p:grpSpPr>
+      <p:sp>
+        <p:nvSpPr>
+          <p:cNvPr id="4" name="TextBox 3">
+            <a:extLst>
+              <a:ext uri="{FF2B5EF4-FFF2-40B4-BE49-F238E27FC236}">
+                <a16:creationId xmlns:a16="http://schemas.microsoft.com/office/drawing/2014/main" id="{7ACEA824-4275-423E-B29E-68999C559143}"/>
+              </a:ext>
+            </a:extLst>
+          </p:cNvPr>
+          <p:cNvSpPr txBox="1"/>
+          <p:nvPr/>
+        </p:nvSpPr>
+        <p:spPr>
+          <a:xfrm>
+            <a:off x="508673" y="90835"/>
+            <a:ext cx="10912731" cy="646331"/>
+          </a:xfrm>
+          <a:prstGeom prst="rect">
+            <a:avLst/>
+          </a:prstGeom>
+          <a:noFill/>
+        </p:spPr>
+        <p:txBody>
+          <a:bodyPr wrap="none" rtlCol="0">
+            <a:spAutoFit/>
+          </a:bodyPr>
+          <a:lstStyle/>
+          <a:p>
+            <a:r>
+              <a:rPr lang="en-US" dirty="0"/>
+              <a:t>git log will give us a history of our commits and git diff allows us to compare the current checkout commit with any</a:t>
+            </a:r>
+          </a:p>
+          <a:p>
+            <a:r>
+              <a:rPr lang="en-US" dirty="0"/>
+              <a:t>other commit…</a:t>
+            </a:r>
+          </a:p>
+        </p:txBody>
+      </p:sp>
       <p:pic>
         <p:nvPicPr>
-          <p:cNvPr id="16386" name="Picture 2"/>
+          <p:cNvPr id="5" name="Picture 4">
+            <a:extLst>
+              <a:ext uri="{FF2B5EF4-FFF2-40B4-BE49-F238E27FC236}">
+                <a16:creationId xmlns:a16="http://schemas.microsoft.com/office/drawing/2014/main" id="{0CB0D549-C2D3-4F69-AEC5-F2BD6E428BA9}"/>
+              </a:ext>
+            </a:extLst>
+          </p:cNvPr>
           <p:cNvPicPr>
-            <a:picLocks noChangeAspect="1" noChangeArrowheads="1"/>
+            <a:picLocks noChangeAspect="1"/>
           </p:cNvPicPr>
           <p:nvPr/>
         </p:nvPicPr>
         <p:blipFill>
-          <a:blip r:embed="rId2" cstate="print"/>
-          <a:srcRect/>
+          <a:blip r:embed="rId2"/>
           <a:stretch>
             <a:fillRect/>
           </a:stretch>
         </p:blipFill>
-        <p:spPr bwMode="auto">
-          <a:xfrm>
-            <a:off x="1851509" y="1849931"/>
-            <a:ext cx="7924800" cy="2419350"/>
+        <p:spPr>
+          <a:xfrm>
+            <a:off x="714563" y="718998"/>
+            <a:ext cx="8947396" cy="3415603"/>
           </a:xfrm>
           <a:prstGeom prst="rect">
             <a:avLst/>
           </a:prstGeom>
-          <a:noFill/>
-          <a:ln w="9525">
-            <a:noFill/>
-            <a:miter lim="800000"/>
-            <a:headEnd/>
-            <a:tailEnd/>
-          </a:ln>
         </p:spPr>
       </p:pic>
-      <p:sp>
-        <p:nvSpPr>
-          <p:cNvPr id="5" name="TextBox 4"/>
-          <p:cNvSpPr txBox="1"/>
-          <p:nvPr/>
-        </p:nvSpPr>
-        <p:spPr>
-          <a:xfrm>
-            <a:off x="1695071" y="631299"/>
-            <a:ext cx="8222187" cy="646331"/>
+      <p:pic>
+        <p:nvPicPr>
+          <p:cNvPr id="6" name="Picture 5">
+            <a:extLst>
+              <a:ext uri="{FF2B5EF4-FFF2-40B4-BE49-F238E27FC236}">
+                <a16:creationId xmlns:a16="http://schemas.microsoft.com/office/drawing/2014/main" id="{AB2F2C3B-E07E-477A-BD0F-F29D4157F67E}"/>
+              </a:ext>
+            </a:extLst>
+          </p:cNvPr>
+          <p:cNvPicPr>
+            <a:picLocks noChangeAspect="1"/>
+          </p:cNvPicPr>
+          <p:nvPr/>
+        </p:nvPicPr>
+        <p:blipFill>
+          <a:blip r:embed="rId3"/>
+          <a:stretch>
+            <a:fillRect/>
+          </a:stretch>
+        </p:blipFill>
+        <p:spPr>
+          <a:xfrm>
+            <a:off x="1943857" y="4158825"/>
+            <a:ext cx="7811952" cy="2667258"/>
           </a:xfrm>
           <a:prstGeom prst="rect">
             <a:avLst/>
           </a:prstGeom>
-          <a:noFill/>
-        </p:spPr>
-        <p:txBody>
-          <a:bodyPr wrap="none" rtlCol="0">
-            <a:spAutoFit/>
-          </a:bodyPr>
-          <a:lstStyle/>
-          <a:p>
-            <a:r>
-              <a:rPr lang="en-US" dirty="0"/>
-              <a:t>Eclipse (which we will work on installing next week) will give us much prettier </a:t>
-            </a:r>
-          </a:p>
-          <a:p>
-            <a:r>
-              <a:rPr lang="en-US" dirty="0"/>
-              <a:t>Results from git diff than the command line git diff (but we will get there next week…)</a:t>
-            </a:r>
-          </a:p>
-        </p:txBody>
-      </p:sp>
+        </p:spPr>
+      </p:pic>
     </p:spTree>
     <p:extLst>
       <p:ext uri="{BB962C8B-B14F-4D97-AF65-F5344CB8AC3E}">
-        <p14:creationId xmlns:p14="http://schemas.microsoft.com/office/powerpoint/2010/main" val="4079138149"/>
+        <p14:creationId xmlns:p14="http://schemas.microsoft.com/office/powerpoint/2010/main" val="2131626001"/>
       </p:ext>
     </p:extLst>
   </p:cSld>
@@ -4738,50 +5068,46 @@
       </p:grpSpPr>
       <p:pic>
         <p:nvPicPr>
-          <p:cNvPr id="6" name="Picture 5">
-            <a:extLst>
-              <a:ext uri="{FF2B5EF4-FFF2-40B4-BE49-F238E27FC236}">
-                <a16:creationId xmlns:a16="http://schemas.microsoft.com/office/drawing/2014/main" id="{018E83B9-E47D-4D9F-AB89-1BE72E06FE79}"/>
-              </a:ext>
-            </a:extLst>
-          </p:cNvPr>
+          <p:cNvPr id="16386" name="Picture 2"/>
           <p:cNvPicPr>
-            <a:picLocks noChangeAspect="1"/>
+            <a:picLocks noChangeAspect="1" noChangeArrowheads="1"/>
           </p:cNvPicPr>
           <p:nvPr/>
         </p:nvPicPr>
         <p:blipFill>
-          <a:blip r:embed="rId2"/>
+          <a:blip r:embed="rId2" cstate="print"/>
+          <a:srcRect/>
           <a:stretch>
             <a:fillRect/>
           </a:stretch>
         </p:blipFill>
-        <p:spPr>
-          <a:xfrm>
-            <a:off x="307807" y="654008"/>
-            <a:ext cx="5996104" cy="3663313"/>
+        <p:spPr bwMode="auto">
+          <a:xfrm>
+            <a:off x="1851509" y="1849931"/>
+            <a:ext cx="7924800" cy="2419350"/>
           </a:xfrm>
           <a:prstGeom prst="rect">
             <a:avLst/>
           </a:prstGeom>
+          <a:noFill/>
+          <a:ln w="9525">
+            <a:noFill/>
+            <a:miter lim="800000"/>
+            <a:headEnd/>
+            <a:tailEnd/>
+          </a:ln>
         </p:spPr>
       </p:pic>
       <p:sp>
         <p:nvSpPr>
-          <p:cNvPr id="7" name="TextBox 6">
-            <a:extLst>
-              <a:ext uri="{FF2B5EF4-FFF2-40B4-BE49-F238E27FC236}">
-                <a16:creationId xmlns:a16="http://schemas.microsoft.com/office/drawing/2014/main" id="{18E4C54F-16A7-4252-B67A-CEE65B57F2D4}"/>
-              </a:ext>
-            </a:extLst>
-          </p:cNvPr>
+          <p:cNvPr id="5" name="TextBox 4"/>
           <p:cNvSpPr txBox="1"/>
           <p:nvPr/>
         </p:nvSpPr>
         <p:spPr>
           <a:xfrm>
-            <a:off x="756954" y="205889"/>
-            <a:ext cx="6537046" cy="369332"/>
+            <a:off x="1695071" y="631299"/>
+            <a:ext cx="8222187" cy="646331"/>
           </a:xfrm>
           <a:prstGeom prst="rect">
             <a:avLst/>
@@ -4795,102 +5121,22 @@
           <a:lstStyle/>
           <a:p>
             <a:r>
-              <a:rPr lang="en-US" dirty="0">
-                <a:latin typeface="Arial" panose="020B0604020202020204" pitchFamily="34" charset="0"/>
-                <a:cs typeface="Arial" panose="020B0604020202020204" pitchFamily="34" charset="0"/>
-              </a:rPr>
-              <a:t>You can actually directly edit the remote repository on </a:t>
-            </a:r>
-            <a:r>
-              <a:rPr lang="en-US" dirty="0" err="1">
-                <a:latin typeface="Arial" panose="020B0604020202020204" pitchFamily="34" charset="0"/>
-                <a:cs typeface="Arial" panose="020B0604020202020204" pitchFamily="34" charset="0"/>
-              </a:rPr>
-              <a:t>github</a:t>
-            </a:r>
-            <a:r>
-              <a:rPr lang="en-US" dirty="0">
-                <a:latin typeface="Arial" panose="020B0604020202020204" pitchFamily="34" charset="0"/>
-                <a:cs typeface="Arial" panose="020B0604020202020204" pitchFamily="34" charset="0"/>
-              </a:rPr>
-              <a:t>…</a:t>
-            </a:r>
-          </a:p>
-        </p:txBody>
-      </p:sp>
-      <p:pic>
-        <p:nvPicPr>
-          <p:cNvPr id="8" name="Picture 7">
-            <a:extLst>
-              <a:ext uri="{FF2B5EF4-FFF2-40B4-BE49-F238E27FC236}">
-                <a16:creationId xmlns:a16="http://schemas.microsoft.com/office/drawing/2014/main" id="{04C97936-B513-4198-94F0-70B75A04AD67}"/>
-              </a:ext>
-            </a:extLst>
-          </p:cNvPr>
-          <p:cNvPicPr>
-            <a:picLocks noChangeAspect="1"/>
-          </p:cNvPicPr>
-          <p:nvPr/>
-        </p:nvPicPr>
-        <p:blipFill>
-          <a:blip r:embed="rId3"/>
-          <a:stretch>
-            <a:fillRect/>
-          </a:stretch>
-        </p:blipFill>
-        <p:spPr>
-          <a:xfrm>
-            <a:off x="4220774" y="3818173"/>
-            <a:ext cx="6537046" cy="2725648"/>
-          </a:xfrm>
-          <a:prstGeom prst="rect">
-            <a:avLst/>
-          </a:prstGeom>
-        </p:spPr>
-      </p:pic>
-      <p:cxnSp>
-        <p:nvCxnSpPr>
-          <p:cNvPr id="10" name="Straight Arrow Connector 9">
-            <a:extLst>
-              <a:ext uri="{FF2B5EF4-FFF2-40B4-BE49-F238E27FC236}">
-                <a16:creationId xmlns:a16="http://schemas.microsoft.com/office/drawing/2014/main" id="{0194E21A-AD94-4004-9E0A-0C6D4AA9C608}"/>
-              </a:ext>
-            </a:extLst>
-          </p:cNvPr>
-          <p:cNvCxnSpPr/>
-          <p:nvPr/>
-        </p:nvCxnSpPr>
-        <p:spPr>
-          <a:xfrm>
-            <a:off x="3942213" y="6394744"/>
-            <a:ext cx="859900" cy="0"/>
-          </a:xfrm>
-          <a:prstGeom prst="straightConnector1">
-            <a:avLst/>
-          </a:prstGeom>
-          <a:ln>
-            <a:tailEnd type="triangle"/>
-          </a:ln>
-        </p:spPr>
-        <p:style>
-          <a:lnRef idx="1">
-            <a:schemeClr val="accent1"/>
-          </a:lnRef>
-          <a:fillRef idx="0">
-            <a:schemeClr val="accent1"/>
-          </a:fillRef>
-          <a:effectRef idx="0">
-            <a:schemeClr val="accent1"/>
-          </a:effectRef>
-          <a:fontRef idx="minor">
-            <a:schemeClr val="tx1"/>
-          </a:fontRef>
-        </p:style>
-      </p:cxnSp>
+              <a:rPr lang="en-US" dirty="0"/>
+              <a:t>Eclipse (which we will work on installing next week) will give us much prettier </a:t>
+            </a:r>
+          </a:p>
+          <a:p>
+            <a:r>
+              <a:rPr lang="en-US" dirty="0"/>
+              <a:t>results from git diff than the command line git diff (but we will get there next week…)</a:t>
+            </a:r>
+          </a:p>
+        </p:txBody>
+      </p:sp>
     </p:spTree>
     <p:extLst>
       <p:ext uri="{BB962C8B-B14F-4D97-AF65-F5344CB8AC3E}">
-        <p14:creationId xmlns:p14="http://schemas.microsoft.com/office/powerpoint/2010/main" val="2791847136"/>
+        <p14:creationId xmlns:p14="http://schemas.microsoft.com/office/powerpoint/2010/main" val="4079138149"/>
       </p:ext>
     </p:extLst>
   </p:cSld>
@@ -5054,73 +5300,12 @@
           <a:chExt cx="0" cy="0"/>
         </a:xfrm>
       </p:grpSpPr>
-      <p:sp>
-        <p:nvSpPr>
-          <p:cNvPr id="4" name="TextBox 3">
-            <a:extLst>
-              <a:ext uri="{FF2B5EF4-FFF2-40B4-BE49-F238E27FC236}">
-                <a16:creationId xmlns:a16="http://schemas.microsoft.com/office/drawing/2014/main" id="{484943F7-FED5-4CE6-A19D-3CF6777ABCCD}"/>
-              </a:ext>
-            </a:extLst>
-          </p:cNvPr>
-          <p:cNvSpPr txBox="1"/>
-          <p:nvPr/>
-        </p:nvSpPr>
-        <p:spPr>
-          <a:xfrm>
-            <a:off x="908342" y="-66613"/>
-            <a:ext cx="10754800" cy="646331"/>
-          </a:xfrm>
-          <a:prstGeom prst="rect">
-            <a:avLst/>
-          </a:prstGeom>
-          <a:noFill/>
-        </p:spPr>
-        <p:txBody>
-          <a:bodyPr wrap="square" rtlCol="0">
-            <a:spAutoFit/>
-          </a:bodyPr>
-          <a:lstStyle/>
-          <a:p>
-            <a:r>
-              <a:rPr lang="en-US" dirty="0">
-                <a:latin typeface="Arial" panose="020B0604020202020204" pitchFamily="34" charset="0"/>
-                <a:cs typeface="Arial" panose="020B0604020202020204" pitchFamily="34" charset="0"/>
-              </a:rPr>
-              <a:t>Now if we try and make a local change and commit it to </a:t>
-            </a:r>
-            <a:r>
-              <a:rPr lang="en-US" dirty="0" err="1">
-                <a:latin typeface="Arial" panose="020B0604020202020204" pitchFamily="34" charset="0"/>
-                <a:cs typeface="Arial" panose="020B0604020202020204" pitchFamily="34" charset="0"/>
-              </a:rPr>
-              <a:t>github</a:t>
-            </a:r>
-            <a:r>
-              <a:rPr lang="en-US" dirty="0">
-                <a:latin typeface="Arial" panose="020B0604020202020204" pitchFamily="34" charset="0"/>
-                <a:cs typeface="Arial" panose="020B0604020202020204" pitchFamily="34" charset="0"/>
-              </a:rPr>
-              <a:t> we will have a conflict, </a:t>
-            </a:r>
-          </a:p>
-          <a:p>
-            <a:r>
-              <a:rPr lang="en-US" dirty="0">
-                <a:latin typeface="Arial" panose="020B0604020202020204" pitchFamily="34" charset="0"/>
-                <a:cs typeface="Arial" panose="020B0604020202020204" pitchFamily="34" charset="0"/>
-              </a:rPr>
-              <a:t>that we will need to resolve…</a:t>
-            </a:r>
-          </a:p>
-        </p:txBody>
-      </p:sp>
       <p:pic>
         <p:nvPicPr>
-          <p:cNvPr id="5" name="Picture 4">
-            <a:extLst>
-              <a:ext uri="{FF2B5EF4-FFF2-40B4-BE49-F238E27FC236}">
-                <a16:creationId xmlns:a16="http://schemas.microsoft.com/office/drawing/2014/main" id="{BF52DD81-AA08-42A4-9E1C-BABF7B2B0DB6}"/>
+          <p:cNvPr id="6" name="Picture 5">
+            <a:extLst>
+              <a:ext uri="{FF2B5EF4-FFF2-40B4-BE49-F238E27FC236}">
+                <a16:creationId xmlns:a16="http://schemas.microsoft.com/office/drawing/2014/main" id="{018E83B9-E47D-4D9F-AB89-1BE72E06FE79}"/>
               </a:ext>
             </a:extLst>
           </p:cNvPr>
@@ -5137,8 +5322,90 @@
         </p:blipFill>
         <p:spPr>
           <a:xfrm>
-            <a:off x="577203" y="930848"/>
-            <a:ext cx="7429950" cy="5336728"/>
+            <a:off x="307807" y="654008"/>
+            <a:ext cx="5996104" cy="3663313"/>
+          </a:xfrm>
+          <a:prstGeom prst="rect">
+            <a:avLst/>
+          </a:prstGeom>
+        </p:spPr>
+      </p:pic>
+      <p:sp>
+        <p:nvSpPr>
+          <p:cNvPr id="7" name="TextBox 6">
+            <a:extLst>
+              <a:ext uri="{FF2B5EF4-FFF2-40B4-BE49-F238E27FC236}">
+                <a16:creationId xmlns:a16="http://schemas.microsoft.com/office/drawing/2014/main" id="{18E4C54F-16A7-4252-B67A-CEE65B57F2D4}"/>
+              </a:ext>
+            </a:extLst>
+          </p:cNvPr>
+          <p:cNvSpPr txBox="1"/>
+          <p:nvPr/>
+        </p:nvSpPr>
+        <p:spPr>
+          <a:xfrm>
+            <a:off x="756954" y="205889"/>
+            <a:ext cx="6537046" cy="369332"/>
+          </a:xfrm>
+          <a:prstGeom prst="rect">
+            <a:avLst/>
+          </a:prstGeom>
+          <a:noFill/>
+        </p:spPr>
+        <p:txBody>
+          <a:bodyPr wrap="none" rtlCol="0">
+            <a:spAutoFit/>
+          </a:bodyPr>
+          <a:lstStyle/>
+          <a:p>
+            <a:r>
+              <a:rPr lang="en-US" dirty="0">
+                <a:latin typeface="Arial" panose="020B0604020202020204" pitchFamily="34" charset="0"/>
+                <a:cs typeface="Arial" panose="020B0604020202020204" pitchFamily="34" charset="0"/>
+              </a:rPr>
+              <a:t>You can actually directly edit the remote repository on </a:t>
+            </a:r>
+            <a:r>
+              <a:rPr lang="en-US" dirty="0" err="1">
+                <a:latin typeface="Arial" panose="020B0604020202020204" pitchFamily="34" charset="0"/>
+                <a:cs typeface="Arial" panose="020B0604020202020204" pitchFamily="34" charset="0"/>
+              </a:rPr>
+              <a:t>github</a:t>
+            </a:r>
+            <a:r>
+              <a:rPr lang="en-US" dirty="0">
+                <a:latin typeface="Arial" panose="020B0604020202020204" pitchFamily="34" charset="0"/>
+                <a:cs typeface="Arial" panose="020B0604020202020204" pitchFamily="34" charset="0"/>
+              </a:rPr>
+              <a:t>…</a:t>
+            </a:r>
+          </a:p>
+        </p:txBody>
+      </p:sp>
+      <p:pic>
+        <p:nvPicPr>
+          <p:cNvPr id="8" name="Picture 7">
+            <a:extLst>
+              <a:ext uri="{FF2B5EF4-FFF2-40B4-BE49-F238E27FC236}">
+                <a16:creationId xmlns:a16="http://schemas.microsoft.com/office/drawing/2014/main" id="{04C97936-B513-4198-94F0-70B75A04AD67}"/>
+              </a:ext>
+            </a:extLst>
+          </p:cNvPr>
+          <p:cNvPicPr>
+            <a:picLocks noChangeAspect="1"/>
+          </p:cNvPicPr>
+          <p:nvPr/>
+        </p:nvPicPr>
+        <p:blipFill>
+          <a:blip r:embed="rId3"/>
+          <a:stretch>
+            <a:fillRect/>
+          </a:stretch>
+        </p:blipFill>
+        <p:spPr>
+          <a:xfrm>
+            <a:off x="4220774" y="3818173"/>
+            <a:ext cx="6537046" cy="2725648"/>
           </a:xfrm>
           <a:prstGeom prst="rect">
             <a:avLst/>
@@ -5147,10 +5414,10 @@
       </p:pic>
       <p:cxnSp>
         <p:nvCxnSpPr>
-          <p:cNvPr id="7" name="Straight Arrow Connector 6">
-            <a:extLst>
-              <a:ext uri="{FF2B5EF4-FFF2-40B4-BE49-F238E27FC236}">
-                <a16:creationId xmlns:a16="http://schemas.microsoft.com/office/drawing/2014/main" id="{A36190F1-EF15-4782-9AD7-7CF2FD4C14AA}"/>
+          <p:cNvPr id="10" name="Straight Arrow Connector 9">
+            <a:extLst>
+              <a:ext uri="{FF2B5EF4-FFF2-40B4-BE49-F238E27FC236}">
+                <a16:creationId xmlns:a16="http://schemas.microsoft.com/office/drawing/2014/main" id="{0194E21A-AD94-4004-9E0A-0C6D4AA9C608}"/>
               </a:ext>
             </a:extLst>
           </p:cNvPr>
@@ -5158,9 +5425,9 @@
           <p:nvPr/>
         </p:nvCxnSpPr>
         <p:spPr>
-          <a:xfrm flipH="1">
-            <a:off x="5855793" y="3342707"/>
-            <a:ext cx="3173150" cy="0"/>
+          <a:xfrm>
+            <a:off x="3942213" y="6394744"/>
+            <a:ext cx="859900" cy="0"/>
           </a:xfrm>
           <a:prstGeom prst="straightConnector1">
             <a:avLst/>
@@ -5184,220 +5451,10 @@
           </a:fontRef>
         </p:style>
       </p:cxnSp>
-      <p:sp>
-        <p:nvSpPr>
-          <p:cNvPr id="8" name="TextBox 7">
-            <a:extLst>
-              <a:ext uri="{FF2B5EF4-FFF2-40B4-BE49-F238E27FC236}">
-                <a16:creationId xmlns:a16="http://schemas.microsoft.com/office/drawing/2014/main" id="{F8B35B05-8B02-42A6-B970-07F125B9913F}"/>
-              </a:ext>
-            </a:extLst>
-          </p:cNvPr>
-          <p:cNvSpPr txBox="1"/>
-          <p:nvPr/>
-        </p:nvSpPr>
-        <p:spPr>
-          <a:xfrm>
-            <a:off x="8932051" y="2961203"/>
-            <a:ext cx="2663614" cy="646331"/>
-          </a:xfrm>
-          <a:prstGeom prst="rect">
-            <a:avLst/>
-          </a:prstGeom>
-          <a:noFill/>
-        </p:spPr>
-        <p:txBody>
-          <a:bodyPr wrap="none" rtlCol="0">
-            <a:spAutoFit/>
-          </a:bodyPr>
-          <a:lstStyle/>
-          <a:p>
-            <a:r>
-              <a:rPr lang="en-US" dirty="0"/>
-              <a:t>Fine.  Stage our change to </a:t>
-            </a:r>
-          </a:p>
-          <a:p>
-            <a:r>
-              <a:rPr lang="en-US" dirty="0"/>
-              <a:t>the local git </a:t>
-            </a:r>
-            <a:r>
-              <a:rPr lang="en-US" dirty="0" err="1"/>
-              <a:t>db</a:t>
-            </a:r>
-            <a:endParaRPr lang="en-US" dirty="0"/>
-          </a:p>
-        </p:txBody>
-      </p:sp>
-      <p:cxnSp>
-        <p:nvCxnSpPr>
-          <p:cNvPr id="9" name="Straight Arrow Connector 8">
-            <a:extLst>
-              <a:ext uri="{FF2B5EF4-FFF2-40B4-BE49-F238E27FC236}">
-                <a16:creationId xmlns:a16="http://schemas.microsoft.com/office/drawing/2014/main" id="{2718DD40-C7CB-4FD6-863A-77282B2F88EB}"/>
-              </a:ext>
-            </a:extLst>
-          </p:cNvPr>
-          <p:cNvCxnSpPr>
-            <a:cxnSpLocks/>
-          </p:cNvCxnSpPr>
-          <p:nvPr/>
-        </p:nvCxnSpPr>
-        <p:spPr>
-          <a:xfrm flipH="1" flipV="1">
-            <a:off x="6789370" y="3803947"/>
-            <a:ext cx="1743011" cy="101934"/>
-          </a:xfrm>
-          <a:prstGeom prst="straightConnector1">
-            <a:avLst/>
-          </a:prstGeom>
-          <a:ln>
-            <a:tailEnd type="triangle"/>
-          </a:ln>
-        </p:spPr>
-        <p:style>
-          <a:lnRef idx="1">
-            <a:schemeClr val="accent1"/>
-          </a:lnRef>
-          <a:fillRef idx="0">
-            <a:schemeClr val="accent1"/>
-          </a:fillRef>
-          <a:effectRef idx="0">
-            <a:schemeClr val="accent1"/>
-          </a:effectRef>
-          <a:fontRef idx="minor">
-            <a:schemeClr val="tx1"/>
-          </a:fontRef>
-        </p:style>
-      </p:cxnSp>
-      <p:sp>
-        <p:nvSpPr>
-          <p:cNvPr id="10" name="TextBox 9">
-            <a:extLst>
-              <a:ext uri="{FF2B5EF4-FFF2-40B4-BE49-F238E27FC236}">
-                <a16:creationId xmlns:a16="http://schemas.microsoft.com/office/drawing/2014/main" id="{8A88ECFB-8520-434F-94BD-4AE821BADE23}"/>
-              </a:ext>
-            </a:extLst>
-          </p:cNvPr>
-          <p:cNvSpPr txBox="1"/>
-          <p:nvPr/>
-        </p:nvSpPr>
-        <p:spPr>
-          <a:xfrm>
-            <a:off x="8642391" y="3628335"/>
-            <a:ext cx="2955296" cy="369332"/>
-          </a:xfrm>
-          <a:prstGeom prst="rect">
-            <a:avLst/>
-          </a:prstGeom>
-          <a:noFill/>
-        </p:spPr>
-        <p:txBody>
-          <a:bodyPr wrap="none" rtlCol="0">
-            <a:spAutoFit/>
-          </a:bodyPr>
-          <a:lstStyle/>
-          <a:p>
-            <a:r>
-              <a:rPr lang="en-US" dirty="0"/>
-              <a:t>Fine.  Commit to our local db.</a:t>
-            </a:r>
-          </a:p>
-        </p:txBody>
-      </p:sp>
-      <p:cxnSp>
-        <p:nvCxnSpPr>
-          <p:cNvPr id="12" name="Straight Arrow Connector 11">
-            <a:extLst>
-              <a:ext uri="{FF2B5EF4-FFF2-40B4-BE49-F238E27FC236}">
-                <a16:creationId xmlns:a16="http://schemas.microsoft.com/office/drawing/2014/main" id="{45820376-AF82-465E-BB99-E69C01A9EB74}"/>
-              </a:ext>
-            </a:extLst>
-          </p:cNvPr>
-          <p:cNvCxnSpPr>
-            <a:cxnSpLocks/>
-          </p:cNvCxnSpPr>
-          <p:nvPr/>
-        </p:nvCxnSpPr>
-        <p:spPr>
-          <a:xfrm flipH="1" flipV="1">
-            <a:off x="5655252" y="4577021"/>
-            <a:ext cx="2987139" cy="91869"/>
-          </a:xfrm>
-          <a:prstGeom prst="straightConnector1">
-            <a:avLst/>
-          </a:prstGeom>
-          <a:ln>
-            <a:tailEnd type="triangle"/>
-          </a:ln>
-        </p:spPr>
-        <p:style>
-          <a:lnRef idx="1">
-            <a:schemeClr val="accent1"/>
-          </a:lnRef>
-          <a:fillRef idx="0">
-            <a:schemeClr val="accent1"/>
-          </a:fillRef>
-          <a:effectRef idx="0">
-            <a:schemeClr val="accent1"/>
-          </a:effectRef>
-          <a:fontRef idx="minor">
-            <a:schemeClr val="tx1"/>
-          </a:fontRef>
-        </p:style>
-      </p:cxnSp>
-      <p:sp>
-        <p:nvSpPr>
-          <p:cNvPr id="13" name="TextBox 12">
-            <a:extLst>
-              <a:ext uri="{FF2B5EF4-FFF2-40B4-BE49-F238E27FC236}">
-                <a16:creationId xmlns:a16="http://schemas.microsoft.com/office/drawing/2014/main" id="{9CC10E8E-477A-487C-B6E2-4C498C3F4CA9}"/>
-              </a:ext>
-            </a:extLst>
-          </p:cNvPr>
-          <p:cNvSpPr txBox="1"/>
-          <p:nvPr/>
-        </p:nvSpPr>
-        <p:spPr>
-          <a:xfrm>
-            <a:off x="8746346" y="4507413"/>
-            <a:ext cx="2924006" cy="923330"/>
-          </a:xfrm>
-          <a:prstGeom prst="rect">
-            <a:avLst/>
-          </a:prstGeom>
-          <a:noFill/>
-        </p:spPr>
-        <p:txBody>
-          <a:bodyPr wrap="none" rtlCol="0">
-            <a:spAutoFit/>
-          </a:bodyPr>
-          <a:lstStyle/>
-          <a:p>
-            <a:r>
-              <a:rPr lang="en-US" dirty="0"/>
-              <a:t>No.  There are changes to the</a:t>
-            </a:r>
-          </a:p>
-          <a:p>
-            <a:r>
-              <a:rPr lang="en-US" dirty="0"/>
-              <a:t>remote database that we will</a:t>
-            </a:r>
-          </a:p>
-          <a:p>
-            <a:r>
-              <a:rPr lang="en-US" dirty="0"/>
-              <a:t>need to resolve..</a:t>
-            </a:r>
-          </a:p>
-        </p:txBody>
-      </p:sp>
     </p:spTree>
     <p:extLst>
       <p:ext uri="{BB962C8B-B14F-4D97-AF65-F5344CB8AC3E}">
-        <p14:creationId xmlns:p14="http://schemas.microsoft.com/office/powerpoint/2010/main" val="1239844119"/>
+        <p14:creationId xmlns:p14="http://schemas.microsoft.com/office/powerpoint/2010/main" val="2791847136"/>
       </p:ext>
     </p:extLst>
   </p:cSld>
@@ -5424,12 +5481,73 @@
           <a:chExt cx="0" cy="0"/>
         </a:xfrm>
       </p:grpSpPr>
+      <p:sp>
+        <p:nvSpPr>
+          <p:cNvPr id="4" name="TextBox 3">
+            <a:extLst>
+              <a:ext uri="{FF2B5EF4-FFF2-40B4-BE49-F238E27FC236}">
+                <a16:creationId xmlns:a16="http://schemas.microsoft.com/office/drawing/2014/main" id="{484943F7-FED5-4CE6-A19D-3CF6777ABCCD}"/>
+              </a:ext>
+            </a:extLst>
+          </p:cNvPr>
+          <p:cNvSpPr txBox="1"/>
+          <p:nvPr/>
+        </p:nvSpPr>
+        <p:spPr>
+          <a:xfrm>
+            <a:off x="908342" y="-66613"/>
+            <a:ext cx="10754800" cy="646331"/>
+          </a:xfrm>
+          <a:prstGeom prst="rect">
+            <a:avLst/>
+          </a:prstGeom>
+          <a:noFill/>
+        </p:spPr>
+        <p:txBody>
+          <a:bodyPr wrap="square" rtlCol="0">
+            <a:spAutoFit/>
+          </a:bodyPr>
+          <a:lstStyle/>
+          <a:p>
+            <a:r>
+              <a:rPr lang="en-US" dirty="0">
+                <a:latin typeface="Arial" panose="020B0604020202020204" pitchFamily="34" charset="0"/>
+                <a:cs typeface="Arial" panose="020B0604020202020204" pitchFamily="34" charset="0"/>
+              </a:rPr>
+              <a:t>Now if we try and make a local change and commit it to </a:t>
+            </a:r>
+            <a:r>
+              <a:rPr lang="en-US" dirty="0" err="1">
+                <a:latin typeface="Arial" panose="020B0604020202020204" pitchFamily="34" charset="0"/>
+                <a:cs typeface="Arial" panose="020B0604020202020204" pitchFamily="34" charset="0"/>
+              </a:rPr>
+              <a:t>github</a:t>
+            </a:r>
+            <a:r>
+              <a:rPr lang="en-US" dirty="0">
+                <a:latin typeface="Arial" panose="020B0604020202020204" pitchFamily="34" charset="0"/>
+                <a:cs typeface="Arial" panose="020B0604020202020204" pitchFamily="34" charset="0"/>
+              </a:rPr>
+              <a:t> we will have a conflict, </a:t>
+            </a:r>
+          </a:p>
+          <a:p>
+            <a:r>
+              <a:rPr lang="en-US" dirty="0">
+                <a:latin typeface="Arial" panose="020B0604020202020204" pitchFamily="34" charset="0"/>
+                <a:cs typeface="Arial" panose="020B0604020202020204" pitchFamily="34" charset="0"/>
+              </a:rPr>
+              <a:t>that we will need to resolve…</a:t>
+            </a:r>
+          </a:p>
+        </p:txBody>
+      </p:sp>
       <p:pic>
         <p:nvPicPr>
-          <p:cNvPr id="4" name="Picture 3">
-            <a:extLst>
-              <a:ext uri="{FF2B5EF4-FFF2-40B4-BE49-F238E27FC236}">
-                <a16:creationId xmlns:a16="http://schemas.microsoft.com/office/drawing/2014/main" id="{4202DC82-B1B9-4FDC-9598-8206E41D5833}"/>
+          <p:cNvPr id="5" name="Picture 4">
+            <a:extLst>
+              <a:ext uri="{FF2B5EF4-FFF2-40B4-BE49-F238E27FC236}">
+                <a16:creationId xmlns:a16="http://schemas.microsoft.com/office/drawing/2014/main" id="{BF52DD81-AA08-42A4-9E1C-BABF7B2B0DB6}"/>
               </a:ext>
             </a:extLst>
           </p:cNvPr>
@@ -5446,20 +5564,59 @@
         </p:blipFill>
         <p:spPr>
           <a:xfrm>
-            <a:off x="182268" y="952058"/>
-            <a:ext cx="9022289" cy="3092112"/>
+            <a:off x="577203" y="930848"/>
+            <a:ext cx="7429950" cy="5336728"/>
           </a:xfrm>
           <a:prstGeom prst="rect">
             <a:avLst/>
           </a:prstGeom>
         </p:spPr>
       </p:pic>
-      <p:sp>
-        <p:nvSpPr>
-          <p:cNvPr id="5" name="TextBox 4">
-            <a:extLst>
-              <a:ext uri="{FF2B5EF4-FFF2-40B4-BE49-F238E27FC236}">
-                <a16:creationId xmlns:a16="http://schemas.microsoft.com/office/drawing/2014/main" id="{9EC8CE36-690A-4281-956E-6A47CF3C5407}"/>
+      <p:cxnSp>
+        <p:nvCxnSpPr>
+          <p:cNvPr id="7" name="Straight Arrow Connector 6">
+            <a:extLst>
+              <a:ext uri="{FF2B5EF4-FFF2-40B4-BE49-F238E27FC236}">
+                <a16:creationId xmlns:a16="http://schemas.microsoft.com/office/drawing/2014/main" id="{A36190F1-EF15-4782-9AD7-7CF2FD4C14AA}"/>
+              </a:ext>
+            </a:extLst>
+          </p:cNvPr>
+          <p:cNvCxnSpPr/>
+          <p:nvPr/>
+        </p:nvCxnSpPr>
+        <p:spPr>
+          <a:xfrm flipH="1">
+            <a:off x="5855793" y="3342707"/>
+            <a:ext cx="3173150" cy="0"/>
+          </a:xfrm>
+          <a:prstGeom prst="straightConnector1">
+            <a:avLst/>
+          </a:prstGeom>
+          <a:ln>
+            <a:tailEnd type="triangle"/>
+          </a:ln>
+        </p:spPr>
+        <p:style>
+          <a:lnRef idx="1">
+            <a:schemeClr val="accent1"/>
+          </a:lnRef>
+          <a:fillRef idx="0">
+            <a:schemeClr val="accent1"/>
+          </a:fillRef>
+          <a:effectRef idx="0">
+            <a:schemeClr val="accent1"/>
+          </a:effectRef>
+          <a:fontRef idx="minor">
+            <a:schemeClr val="tx1"/>
+          </a:fontRef>
+        </p:style>
+      </p:cxnSp>
+      <p:sp>
+        <p:nvSpPr>
+          <p:cNvPr id="8" name="TextBox 7">
+            <a:extLst>
+              <a:ext uri="{FF2B5EF4-FFF2-40B4-BE49-F238E27FC236}">
+                <a16:creationId xmlns:a16="http://schemas.microsoft.com/office/drawing/2014/main" id="{F8B35B05-8B02-42A6-B970-07F125B9913F}"/>
               </a:ext>
             </a:extLst>
           </p:cNvPr>
@@ -5468,8 +5625,8 @@
         </p:nvSpPr>
         <p:spPr>
           <a:xfrm>
-            <a:off x="617674" y="387560"/>
-            <a:ext cx="10277172" cy="369332"/>
+            <a:off x="8932051" y="2961203"/>
+            <a:ext cx="2663614" cy="646331"/>
           </a:xfrm>
           <a:prstGeom prst="rect">
             <a:avLst/>
@@ -5483,21 +5640,70 @@
           <a:lstStyle/>
           <a:p>
             <a:r>
-              <a:rPr lang="en-US" dirty="0">
-                <a:latin typeface="Arial" panose="020B0604020202020204" pitchFamily="34" charset="0"/>
-                <a:cs typeface="Arial" panose="020B0604020202020204" pitchFamily="34" charset="0"/>
-              </a:rPr>
-              <a:t>git fetch grabs the latest commits from the remote database but does not merge them into our work.</a:t>
-            </a:r>
-          </a:p>
-        </p:txBody>
-      </p:sp>
-      <p:sp>
-        <p:nvSpPr>
-          <p:cNvPr id="6" name="TextBox 5">
-            <a:extLst>
-              <a:ext uri="{FF2B5EF4-FFF2-40B4-BE49-F238E27FC236}">
-                <a16:creationId xmlns:a16="http://schemas.microsoft.com/office/drawing/2014/main" id="{456F9277-807A-40B7-BA25-FBE221107B25}"/>
+              <a:rPr lang="en-US" dirty="0"/>
+              <a:t>Fine.  Stage our change to </a:t>
+            </a:r>
+          </a:p>
+          <a:p>
+            <a:r>
+              <a:rPr lang="en-US" dirty="0"/>
+              <a:t>the local git </a:t>
+            </a:r>
+            <a:r>
+              <a:rPr lang="en-US" dirty="0" err="1"/>
+              <a:t>db</a:t>
+            </a:r>
+            <a:endParaRPr lang="en-US" dirty="0"/>
+          </a:p>
+        </p:txBody>
+      </p:sp>
+      <p:cxnSp>
+        <p:nvCxnSpPr>
+          <p:cNvPr id="9" name="Straight Arrow Connector 8">
+            <a:extLst>
+              <a:ext uri="{FF2B5EF4-FFF2-40B4-BE49-F238E27FC236}">
+                <a16:creationId xmlns:a16="http://schemas.microsoft.com/office/drawing/2014/main" id="{2718DD40-C7CB-4FD6-863A-77282B2F88EB}"/>
+              </a:ext>
+            </a:extLst>
+          </p:cNvPr>
+          <p:cNvCxnSpPr>
+            <a:cxnSpLocks/>
+          </p:cNvCxnSpPr>
+          <p:nvPr/>
+        </p:nvCxnSpPr>
+        <p:spPr>
+          <a:xfrm flipH="1" flipV="1">
+            <a:off x="6789370" y="3803947"/>
+            <a:ext cx="1743011" cy="101934"/>
+          </a:xfrm>
+          <a:prstGeom prst="straightConnector1">
+            <a:avLst/>
+          </a:prstGeom>
+          <a:ln>
+            <a:tailEnd type="triangle"/>
+          </a:ln>
+        </p:spPr>
+        <p:style>
+          <a:lnRef idx="1">
+            <a:schemeClr val="accent1"/>
+          </a:lnRef>
+          <a:fillRef idx="0">
+            <a:schemeClr val="accent1"/>
+          </a:fillRef>
+          <a:effectRef idx="0">
+            <a:schemeClr val="accent1"/>
+          </a:effectRef>
+          <a:fontRef idx="minor">
+            <a:schemeClr val="tx1"/>
+          </a:fontRef>
+        </p:style>
+      </p:cxnSp>
+      <p:sp>
+        <p:nvSpPr>
+          <p:cNvPr id="10" name="TextBox 9">
+            <a:extLst>
+              <a:ext uri="{FF2B5EF4-FFF2-40B4-BE49-F238E27FC236}">
+                <a16:creationId xmlns:a16="http://schemas.microsoft.com/office/drawing/2014/main" id="{8A88ECFB-8520-434F-94BD-4AE821BADE23}"/>
               </a:ext>
             </a:extLst>
           </p:cNvPr>
@@ -5506,8 +5712,8 @@
         </p:nvSpPr>
         <p:spPr>
           <a:xfrm>
-            <a:off x="770074" y="4391328"/>
-            <a:ext cx="7673896" cy="369332"/>
+            <a:off x="8642391" y="3628335"/>
+            <a:ext cx="2955296" cy="369332"/>
           </a:xfrm>
           <a:prstGeom prst="rect">
             <a:avLst/>
@@ -5521,49 +5727,104 @@
           <a:lstStyle/>
           <a:p>
             <a:r>
-              <a:rPr lang="en-US" dirty="0">
-                <a:latin typeface="Arial" panose="020B0604020202020204" pitchFamily="34" charset="0"/>
-                <a:cs typeface="Arial" panose="020B0604020202020204" pitchFamily="34" charset="0"/>
-              </a:rPr>
-              <a:t>git merge here tries to merge, but we will have to deal with the conflict first</a:t>
-            </a:r>
-          </a:p>
-        </p:txBody>
-      </p:sp>
-      <p:pic>
-        <p:nvPicPr>
-          <p:cNvPr id="7" name="Picture 6">
-            <a:extLst>
-              <a:ext uri="{FF2B5EF4-FFF2-40B4-BE49-F238E27FC236}">
-                <a16:creationId xmlns:a16="http://schemas.microsoft.com/office/drawing/2014/main" id="{9DDD12B8-4B1A-47FF-B012-39EF7F447253}"/>
-              </a:ext>
-            </a:extLst>
-          </p:cNvPr>
-          <p:cNvPicPr>
-            <a:picLocks noChangeAspect="1"/>
-          </p:cNvPicPr>
-          <p:nvPr/>
-        </p:nvPicPr>
-        <p:blipFill>
-          <a:blip r:embed="rId3"/>
-          <a:stretch>
-            <a:fillRect/>
-          </a:stretch>
-        </p:blipFill>
-        <p:spPr>
-          <a:xfrm>
-            <a:off x="333060" y="4738791"/>
-            <a:ext cx="9204556" cy="1763915"/>
+              <a:rPr lang="en-US" dirty="0"/>
+              <a:t>Fine.  Commit to our local db.</a:t>
+            </a:r>
+          </a:p>
+        </p:txBody>
+      </p:sp>
+      <p:cxnSp>
+        <p:nvCxnSpPr>
+          <p:cNvPr id="12" name="Straight Arrow Connector 11">
+            <a:extLst>
+              <a:ext uri="{FF2B5EF4-FFF2-40B4-BE49-F238E27FC236}">
+                <a16:creationId xmlns:a16="http://schemas.microsoft.com/office/drawing/2014/main" id="{45820376-AF82-465E-BB99-E69C01A9EB74}"/>
+              </a:ext>
+            </a:extLst>
+          </p:cNvPr>
+          <p:cNvCxnSpPr>
+            <a:cxnSpLocks/>
+          </p:cNvCxnSpPr>
+          <p:nvPr/>
+        </p:nvCxnSpPr>
+        <p:spPr>
+          <a:xfrm flipH="1" flipV="1">
+            <a:off x="5655252" y="4577021"/>
+            <a:ext cx="2987139" cy="91869"/>
+          </a:xfrm>
+          <a:prstGeom prst="straightConnector1">
+            <a:avLst/>
+          </a:prstGeom>
+          <a:ln>
+            <a:tailEnd type="triangle"/>
+          </a:ln>
+        </p:spPr>
+        <p:style>
+          <a:lnRef idx="1">
+            <a:schemeClr val="accent1"/>
+          </a:lnRef>
+          <a:fillRef idx="0">
+            <a:schemeClr val="accent1"/>
+          </a:fillRef>
+          <a:effectRef idx="0">
+            <a:schemeClr val="accent1"/>
+          </a:effectRef>
+          <a:fontRef idx="minor">
+            <a:schemeClr val="tx1"/>
+          </a:fontRef>
+        </p:style>
+      </p:cxnSp>
+      <p:sp>
+        <p:nvSpPr>
+          <p:cNvPr id="13" name="TextBox 12">
+            <a:extLst>
+              <a:ext uri="{FF2B5EF4-FFF2-40B4-BE49-F238E27FC236}">
+                <a16:creationId xmlns:a16="http://schemas.microsoft.com/office/drawing/2014/main" id="{9CC10E8E-477A-487C-B6E2-4C498C3F4CA9}"/>
+              </a:ext>
+            </a:extLst>
+          </p:cNvPr>
+          <p:cNvSpPr txBox="1"/>
+          <p:nvPr/>
+        </p:nvSpPr>
+        <p:spPr>
+          <a:xfrm>
+            <a:off x="8746346" y="4507413"/>
+            <a:ext cx="2924006" cy="923330"/>
           </a:xfrm>
           <a:prstGeom prst="rect">
             <a:avLst/>
           </a:prstGeom>
-        </p:spPr>
-      </p:pic>
+          <a:noFill/>
+        </p:spPr>
+        <p:txBody>
+          <a:bodyPr wrap="none" rtlCol="0">
+            <a:spAutoFit/>
+          </a:bodyPr>
+          <a:lstStyle/>
+          <a:p>
+            <a:r>
+              <a:rPr lang="en-US" dirty="0"/>
+              <a:t>No.  There are changes to the</a:t>
+            </a:r>
+          </a:p>
+          <a:p>
+            <a:r>
+              <a:rPr lang="en-US" dirty="0"/>
+              <a:t>remote database that we will</a:t>
+            </a:r>
+          </a:p>
+          <a:p>
+            <a:r>
+              <a:rPr lang="en-US" dirty="0"/>
+              <a:t>need to resolve..</a:t>
+            </a:r>
+          </a:p>
+        </p:txBody>
+      </p:sp>
     </p:spTree>
     <p:extLst>
       <p:ext uri="{BB962C8B-B14F-4D97-AF65-F5344CB8AC3E}">
-        <p14:creationId xmlns:p14="http://schemas.microsoft.com/office/powerpoint/2010/main" val="3452147019"/>
+        <p14:creationId xmlns:p14="http://schemas.microsoft.com/office/powerpoint/2010/main" val="1239844119"/>
       </p:ext>
     </p:extLst>
   </p:cSld>
@@ -5595,7 +5856,7 @@
           <p:cNvPr id="4" name="Picture 3">
             <a:extLst>
               <a:ext uri="{FF2B5EF4-FFF2-40B4-BE49-F238E27FC236}">
-                <a16:creationId xmlns:a16="http://schemas.microsoft.com/office/drawing/2014/main" id="{DDEA5531-BA85-44CA-BE99-0104FB9346AB}"/>
+                <a16:creationId xmlns:a16="http://schemas.microsoft.com/office/drawing/2014/main" id="{4202DC82-B1B9-4FDC-9598-8206E41D5833}"/>
               </a:ext>
             </a:extLst>
           </p:cNvPr>
@@ -5612,8 +5873,8 @@
         </p:blipFill>
         <p:spPr>
           <a:xfrm>
-            <a:off x="1144514" y="308773"/>
-            <a:ext cx="7327311" cy="3244030"/>
+            <a:off x="182268" y="952058"/>
+            <a:ext cx="9022289" cy="3092112"/>
           </a:xfrm>
           <a:prstGeom prst="rect">
             <a:avLst/>
@@ -5625,7 +5886,7 @@
           <p:cNvPr id="5" name="TextBox 4">
             <a:extLst>
               <a:ext uri="{FF2B5EF4-FFF2-40B4-BE49-F238E27FC236}">
-                <a16:creationId xmlns:a16="http://schemas.microsoft.com/office/drawing/2014/main" id="{A1F6E735-BB5B-46CD-B6C3-E981C4D5D325}"/>
+                <a16:creationId xmlns:a16="http://schemas.microsoft.com/office/drawing/2014/main" id="{9EC8CE36-690A-4281-956E-6A47CF3C5407}"/>
               </a:ext>
             </a:extLst>
           </p:cNvPr>
@@ -5634,8 +5895,8 @@
         </p:nvSpPr>
         <p:spPr>
           <a:xfrm>
-            <a:off x="1641075" y="-60560"/>
-            <a:ext cx="4301177" cy="369332"/>
+            <a:off x="617674" y="387560"/>
+            <a:ext cx="10277172" cy="369332"/>
           </a:xfrm>
           <a:prstGeom prst="rect">
             <a:avLst/>
@@ -5653,17 +5914,55 @@
                 <a:latin typeface="Arial" panose="020B0604020202020204" pitchFamily="34" charset="0"/>
                 <a:cs typeface="Arial" panose="020B0604020202020204" pitchFamily="34" charset="0"/>
               </a:rPr>
-              <a:t>Git indicates to us where the conflict is…</a:t>
+              <a:t>git fetch grabs the latest commits from the remote database but does not merge them into our work.</a:t>
+            </a:r>
+          </a:p>
+        </p:txBody>
+      </p:sp>
+      <p:sp>
+        <p:nvSpPr>
+          <p:cNvPr id="6" name="TextBox 5">
+            <a:extLst>
+              <a:ext uri="{FF2B5EF4-FFF2-40B4-BE49-F238E27FC236}">
+                <a16:creationId xmlns:a16="http://schemas.microsoft.com/office/drawing/2014/main" id="{456F9277-807A-40B7-BA25-FBE221107B25}"/>
+              </a:ext>
+            </a:extLst>
+          </p:cNvPr>
+          <p:cNvSpPr txBox="1"/>
+          <p:nvPr/>
+        </p:nvSpPr>
+        <p:spPr>
+          <a:xfrm>
+            <a:off x="770074" y="4391328"/>
+            <a:ext cx="7673896" cy="369332"/>
+          </a:xfrm>
+          <a:prstGeom prst="rect">
+            <a:avLst/>
+          </a:prstGeom>
+          <a:noFill/>
+        </p:spPr>
+        <p:txBody>
+          <a:bodyPr wrap="none" rtlCol="0">
+            <a:spAutoFit/>
+          </a:bodyPr>
+          <a:lstStyle/>
+          <a:p>
+            <a:r>
+              <a:rPr lang="en-US" dirty="0">
+                <a:latin typeface="Arial" panose="020B0604020202020204" pitchFamily="34" charset="0"/>
+                <a:cs typeface="Arial" panose="020B0604020202020204" pitchFamily="34" charset="0"/>
+              </a:rPr>
+              <a:t>git merge here tries to merge, but we will have to deal with the conflict first</a:t>
             </a:r>
           </a:p>
         </p:txBody>
       </p:sp>
       <p:pic>
         <p:nvPicPr>
-          <p:cNvPr id="6" name="Picture 5">
-            <a:extLst>
-              <a:ext uri="{FF2B5EF4-FFF2-40B4-BE49-F238E27FC236}">
-                <a16:creationId xmlns:a16="http://schemas.microsoft.com/office/drawing/2014/main" id="{35242EC4-967E-4B95-8926-CD4120B51F61}"/>
+          <p:cNvPr id="7" name="Picture 6">
+            <a:extLst>
+              <a:ext uri="{FF2B5EF4-FFF2-40B4-BE49-F238E27FC236}">
+                <a16:creationId xmlns:a16="http://schemas.microsoft.com/office/drawing/2014/main" id="{9DDD12B8-4B1A-47FF-B012-39EF7F447253}"/>
               </a:ext>
             </a:extLst>
           </p:cNvPr>
@@ -5680,53 +5979,18 @@
         </p:blipFill>
         <p:spPr>
           <a:xfrm>
-            <a:off x="1071847" y="4082692"/>
-            <a:ext cx="7087601" cy="2584555"/>
+            <a:off x="333060" y="4738791"/>
+            <a:ext cx="9204556" cy="1763915"/>
           </a:xfrm>
           <a:prstGeom prst="rect">
             <a:avLst/>
           </a:prstGeom>
         </p:spPr>
       </p:pic>
-      <p:sp>
-        <p:nvSpPr>
-          <p:cNvPr id="7" name="TextBox 6">
-            <a:extLst>
-              <a:ext uri="{FF2B5EF4-FFF2-40B4-BE49-F238E27FC236}">
-                <a16:creationId xmlns:a16="http://schemas.microsoft.com/office/drawing/2014/main" id="{3BE4E859-3B97-4D6D-9E22-215B923BFB7D}"/>
-              </a:ext>
-            </a:extLst>
-          </p:cNvPr>
-          <p:cNvSpPr txBox="1"/>
-          <p:nvPr/>
-        </p:nvSpPr>
-        <p:spPr>
-          <a:xfrm>
-            <a:off x="2567587" y="3772657"/>
-            <a:ext cx="4162230" cy="369332"/>
-          </a:xfrm>
-          <a:prstGeom prst="rect">
-            <a:avLst/>
-          </a:prstGeom>
-          <a:noFill/>
-        </p:spPr>
-        <p:txBody>
-          <a:bodyPr wrap="none" rtlCol="0">
-            <a:spAutoFit/>
-          </a:bodyPr>
-          <a:lstStyle/>
-          <a:p>
-            <a:r>
-              <a:rPr lang="en-US" dirty="0"/>
-              <a:t>We use a text editor to resolve the conflict</a:t>
-            </a:r>
-          </a:p>
-        </p:txBody>
-      </p:sp>
     </p:spTree>
     <p:extLst>
       <p:ext uri="{BB962C8B-B14F-4D97-AF65-F5344CB8AC3E}">
-        <p14:creationId xmlns:p14="http://schemas.microsoft.com/office/powerpoint/2010/main" val="128994408"/>
+        <p14:creationId xmlns:p14="http://schemas.microsoft.com/office/powerpoint/2010/main" val="3452147019"/>
       </p:ext>
     </p:extLst>
   </p:cSld>
@@ -5758,7 +6022,7 @@
           <p:cNvPr id="4" name="Picture 3">
             <a:extLst>
               <a:ext uri="{FF2B5EF4-FFF2-40B4-BE49-F238E27FC236}">
-                <a16:creationId xmlns:a16="http://schemas.microsoft.com/office/drawing/2014/main" id="{D23D21CB-8B08-4DB0-8C55-AC9AC81782A4}"/>
+                <a16:creationId xmlns:a16="http://schemas.microsoft.com/office/drawing/2014/main" id="{DDEA5531-BA85-44CA-BE99-0104FB9346AB}"/>
               </a:ext>
             </a:extLst>
           </p:cNvPr>
@@ -5775,8 +6039,8 @@
         </p:blipFill>
         <p:spPr>
           <a:xfrm>
-            <a:off x="193780" y="1257791"/>
-            <a:ext cx="10624152" cy="5367067"/>
+            <a:off x="1144514" y="308773"/>
+            <a:ext cx="7327311" cy="3244030"/>
           </a:xfrm>
           <a:prstGeom prst="rect">
             <a:avLst/>
@@ -5788,7 +6052,7 @@
           <p:cNvPr id="5" name="TextBox 4">
             <a:extLst>
               <a:ext uri="{FF2B5EF4-FFF2-40B4-BE49-F238E27FC236}">
-                <a16:creationId xmlns:a16="http://schemas.microsoft.com/office/drawing/2014/main" id="{9D729DB3-B4AF-48A6-B0C7-F076317878E0}"/>
+                <a16:creationId xmlns:a16="http://schemas.microsoft.com/office/drawing/2014/main" id="{A1F6E735-BB5B-46CD-B6C3-E981C4D5D325}"/>
               </a:ext>
             </a:extLst>
           </p:cNvPr>
@@ -5797,8 +6061,8 @@
         </p:nvSpPr>
         <p:spPr>
           <a:xfrm>
-            <a:off x="726675" y="405727"/>
-            <a:ext cx="10123284" cy="646331"/>
+            <a:off x="1641075" y="-60560"/>
+            <a:ext cx="4301177" cy="369332"/>
           </a:xfrm>
           <a:prstGeom prst="rect">
             <a:avLst/>
@@ -5816,16 +6080,72 @@
                 <a:latin typeface="Arial" panose="020B0604020202020204" pitchFamily="34" charset="0"/>
                 <a:cs typeface="Arial" panose="020B0604020202020204" pitchFamily="34" charset="0"/>
               </a:rPr>
-              <a:t>With the conflict resolved, we stage (with git add), commit to the local repository (with git commit) </a:t>
-            </a:r>
-          </a:p>
-          <a:p>
-            <a:r>
-              <a:rPr lang="en-US" dirty="0">
-                <a:latin typeface="Arial" panose="020B0604020202020204" pitchFamily="34" charset="0"/>
-                <a:cs typeface="Arial" panose="020B0604020202020204" pitchFamily="34" charset="0"/>
-              </a:rPr>
-              <a:t>and finally push to the remote repository…</a:t>
+              <a:t>Git indicates to us where the conflict is…</a:t>
+            </a:r>
+          </a:p>
+        </p:txBody>
+      </p:sp>
+      <p:pic>
+        <p:nvPicPr>
+          <p:cNvPr id="6" name="Picture 5">
+            <a:extLst>
+              <a:ext uri="{FF2B5EF4-FFF2-40B4-BE49-F238E27FC236}">
+                <a16:creationId xmlns:a16="http://schemas.microsoft.com/office/drawing/2014/main" id="{35242EC4-967E-4B95-8926-CD4120B51F61}"/>
+              </a:ext>
+            </a:extLst>
+          </p:cNvPr>
+          <p:cNvPicPr>
+            <a:picLocks noChangeAspect="1"/>
+          </p:cNvPicPr>
+          <p:nvPr/>
+        </p:nvPicPr>
+        <p:blipFill>
+          <a:blip r:embed="rId3"/>
+          <a:stretch>
+            <a:fillRect/>
+          </a:stretch>
+        </p:blipFill>
+        <p:spPr>
+          <a:xfrm>
+            <a:off x="1071847" y="4082692"/>
+            <a:ext cx="7087601" cy="2584555"/>
+          </a:xfrm>
+          <a:prstGeom prst="rect">
+            <a:avLst/>
+          </a:prstGeom>
+        </p:spPr>
+      </p:pic>
+      <p:sp>
+        <p:nvSpPr>
+          <p:cNvPr id="7" name="TextBox 6">
+            <a:extLst>
+              <a:ext uri="{FF2B5EF4-FFF2-40B4-BE49-F238E27FC236}">
+                <a16:creationId xmlns:a16="http://schemas.microsoft.com/office/drawing/2014/main" id="{3BE4E859-3B97-4D6D-9E22-215B923BFB7D}"/>
+              </a:ext>
+            </a:extLst>
+          </p:cNvPr>
+          <p:cNvSpPr txBox="1"/>
+          <p:nvPr/>
+        </p:nvSpPr>
+        <p:spPr>
+          <a:xfrm>
+            <a:off x="2567587" y="3772657"/>
+            <a:ext cx="4162230" cy="369332"/>
+          </a:xfrm>
+          <a:prstGeom prst="rect">
+            <a:avLst/>
+          </a:prstGeom>
+          <a:noFill/>
+        </p:spPr>
+        <p:txBody>
+          <a:bodyPr wrap="none" rtlCol="0">
+            <a:spAutoFit/>
+          </a:bodyPr>
+          <a:lstStyle/>
+          <a:p>
+            <a:r>
+              <a:rPr lang="en-US" dirty="0"/>
+              <a:t>We use a text editor to resolve the conflict</a:t>
             </a:r>
           </a:p>
         </p:txBody>
@@ -5833,7 +6153,7 @@
     </p:spTree>
     <p:extLst>
       <p:ext uri="{BB962C8B-B14F-4D97-AF65-F5344CB8AC3E}">
-        <p14:creationId xmlns:p14="http://schemas.microsoft.com/office/powerpoint/2010/main" val="3354533758"/>
+        <p14:creationId xmlns:p14="http://schemas.microsoft.com/office/powerpoint/2010/main" val="128994408"/>
       </p:ext>
     </p:extLst>
   </p:cSld>
@@ -5865,7 +6185,7 @@
           <p:cNvPr id="4" name="Picture 3">
             <a:extLst>
               <a:ext uri="{FF2B5EF4-FFF2-40B4-BE49-F238E27FC236}">
-                <a16:creationId xmlns:a16="http://schemas.microsoft.com/office/drawing/2014/main" id="{EF4A4435-8BC1-4BC4-9BB1-6618B121A8C7}"/>
+                <a16:creationId xmlns:a16="http://schemas.microsoft.com/office/drawing/2014/main" id="{D23D21CB-8B08-4DB0-8C55-AC9AC81782A4}"/>
               </a:ext>
             </a:extLst>
           </p:cNvPr>
@@ -5882,8 +6202,8 @@
         </p:blipFill>
         <p:spPr>
           <a:xfrm>
-            <a:off x="119995" y="36333"/>
-            <a:ext cx="8784809" cy="6503746"/>
+            <a:off x="193780" y="1257791"/>
+            <a:ext cx="10624152" cy="5367067"/>
           </a:xfrm>
           <a:prstGeom prst="rect">
             <a:avLst/>
@@ -5895,7 +6215,7 @@
           <p:cNvPr id="5" name="TextBox 4">
             <a:extLst>
               <a:ext uri="{FF2B5EF4-FFF2-40B4-BE49-F238E27FC236}">
-                <a16:creationId xmlns:a16="http://schemas.microsoft.com/office/drawing/2014/main" id="{10B42199-DC88-4AB1-8A66-7149C7E5E5CB}"/>
+                <a16:creationId xmlns:a16="http://schemas.microsoft.com/office/drawing/2014/main" id="{9D729DB3-B4AF-48A6-B0C7-F076317878E0}"/>
               </a:ext>
             </a:extLst>
           </p:cNvPr>
@@ -5904,8 +6224,8 @@
         </p:nvSpPr>
         <p:spPr>
           <a:xfrm>
-            <a:off x="9398336" y="551062"/>
-            <a:ext cx="2543197" cy="923330"/>
+            <a:off x="726675" y="405727"/>
+            <a:ext cx="10123284" cy="646331"/>
           </a:xfrm>
           <a:prstGeom prst="rect">
             <a:avLst/>
@@ -5919,20 +6239,20 @@
           <a:lstStyle/>
           <a:p>
             <a:r>
-              <a:rPr lang="en-US" dirty="0"/>
-              <a:t>Git log shows the </a:t>
-            </a:r>
-          </a:p>
-          <a:p>
-            <a:r>
-              <a:rPr lang="en-US" dirty="0"/>
-              <a:t>entire history of commits</a:t>
-            </a:r>
-          </a:p>
-          <a:p>
-            <a:r>
-              <a:rPr lang="en-US" dirty="0"/>
-              <a:t>(both local and remote)</a:t>
+              <a:rPr lang="en-US" dirty="0">
+                <a:latin typeface="Arial" panose="020B0604020202020204" pitchFamily="34" charset="0"/>
+                <a:cs typeface="Arial" panose="020B0604020202020204" pitchFamily="34" charset="0"/>
+              </a:rPr>
+              <a:t>With the conflict resolved, we stage (with git add), commit to the local repository (with git commit) </a:t>
+            </a:r>
+          </a:p>
+          <a:p>
+            <a:r>
+              <a:rPr lang="en-US" dirty="0">
+                <a:latin typeface="Arial" panose="020B0604020202020204" pitchFamily="34" charset="0"/>
+                <a:cs typeface="Arial" panose="020B0604020202020204" pitchFamily="34" charset="0"/>
+              </a:rPr>
+              <a:t>and finally push to the remote repository…</a:t>
             </a:r>
           </a:p>
         </p:txBody>
@@ -5940,7 +6260,7 @@
     </p:spTree>
     <p:extLst>
       <p:ext uri="{BB962C8B-B14F-4D97-AF65-F5344CB8AC3E}">
-        <p14:creationId xmlns:p14="http://schemas.microsoft.com/office/powerpoint/2010/main" val="2585424307"/>
+        <p14:creationId xmlns:p14="http://schemas.microsoft.com/office/powerpoint/2010/main" val="3354533758"/>
       </p:ext>
     </p:extLst>
   </p:cSld>
@@ -5967,83 +6287,12 @@
           <a:chExt cx="0" cy="0"/>
         </a:xfrm>
       </p:grpSpPr>
-      <p:sp>
-        <p:nvSpPr>
-          <p:cNvPr id="4" name="TextBox 3">
-            <a:extLst>
-              <a:ext uri="{FF2B5EF4-FFF2-40B4-BE49-F238E27FC236}">
-                <a16:creationId xmlns:a16="http://schemas.microsoft.com/office/drawing/2014/main" id="{26D7D82D-AE7E-4588-811F-BC5859601887}"/>
-              </a:ext>
-            </a:extLst>
-          </p:cNvPr>
-          <p:cNvSpPr txBox="1"/>
-          <p:nvPr/>
-        </p:nvSpPr>
-        <p:spPr>
-          <a:xfrm>
-            <a:off x="799341" y="236167"/>
-            <a:ext cx="8879354" cy="1477328"/>
-          </a:xfrm>
-          <a:prstGeom prst="rect">
-            <a:avLst/>
-          </a:prstGeom>
-          <a:noFill/>
-        </p:spPr>
-        <p:txBody>
-          <a:bodyPr wrap="none" rtlCol="0">
-            <a:spAutoFit/>
-          </a:bodyPr>
-          <a:lstStyle/>
-          <a:p>
-            <a:r>
-              <a:rPr lang="en-US" dirty="0">
-                <a:latin typeface="Arial" panose="020B0604020202020204" pitchFamily="34" charset="0"/>
-                <a:cs typeface="Arial" panose="020B0604020202020204" pitchFamily="34" charset="0"/>
-              </a:rPr>
-              <a:t>Eclipse will allow us to do a lot of these interactions via GUI, where in some ways it is</a:t>
-            </a:r>
-          </a:p>
-          <a:p>
-            <a:r>
-              <a:rPr lang="en-US" dirty="0">
-                <a:latin typeface="Arial" panose="020B0604020202020204" pitchFamily="34" charset="0"/>
-                <a:cs typeface="Arial" panose="020B0604020202020204" pitchFamily="34" charset="0"/>
-              </a:rPr>
-              <a:t>easier to see what is going on, but it is also easier to make a mistake.</a:t>
-            </a:r>
-          </a:p>
-          <a:p>
-            <a:endParaRPr lang="en-US" dirty="0">
-              <a:latin typeface="Arial" panose="020B0604020202020204" pitchFamily="34" charset="0"/>
-              <a:cs typeface="Arial" panose="020B0604020202020204" pitchFamily="34" charset="0"/>
-            </a:endParaRPr>
-          </a:p>
-          <a:p>
-            <a:r>
-              <a:rPr lang="en-US" dirty="0">
-                <a:latin typeface="Arial" panose="020B0604020202020204" pitchFamily="34" charset="0"/>
-                <a:cs typeface="Arial" panose="020B0604020202020204" pitchFamily="34" charset="0"/>
-              </a:rPr>
-              <a:t>Within the same repository, you can switch back and forth between Eclipse and the</a:t>
-            </a:r>
-          </a:p>
-          <a:p>
-            <a:r>
-              <a:rPr lang="en-US" dirty="0">
-                <a:latin typeface="Arial" panose="020B0604020202020204" pitchFamily="34" charset="0"/>
-                <a:cs typeface="Arial" panose="020B0604020202020204" pitchFamily="34" charset="0"/>
-              </a:rPr>
-              <a:t>command line (Eclipse just executes command line instructions).  </a:t>
-            </a:r>
-          </a:p>
-        </p:txBody>
-      </p:sp>
       <p:pic>
         <p:nvPicPr>
-          <p:cNvPr id="5" name="Picture 4">
-            <a:extLst>
-              <a:ext uri="{FF2B5EF4-FFF2-40B4-BE49-F238E27FC236}">
-                <a16:creationId xmlns:a16="http://schemas.microsoft.com/office/drawing/2014/main" id="{982A3B7A-C96F-4496-A8B8-B3866030C84F}"/>
+          <p:cNvPr id="4" name="Picture 3">
+            <a:extLst>
+              <a:ext uri="{FF2B5EF4-FFF2-40B4-BE49-F238E27FC236}">
+                <a16:creationId xmlns:a16="http://schemas.microsoft.com/office/drawing/2014/main" id="{EF4A4435-8BC1-4BC4-9BB1-6618B121A8C7}"/>
               </a:ext>
             </a:extLst>
           </p:cNvPr>
@@ -6060,59 +6309,20 @@
         </p:blipFill>
         <p:spPr>
           <a:xfrm>
-            <a:off x="3933450" y="1604742"/>
-            <a:ext cx="6276341" cy="4955945"/>
+            <a:off x="119995" y="36333"/>
+            <a:ext cx="8784809" cy="6503746"/>
           </a:xfrm>
           <a:prstGeom prst="rect">
             <a:avLst/>
           </a:prstGeom>
         </p:spPr>
       </p:pic>
-      <p:cxnSp>
-        <p:nvCxnSpPr>
-          <p:cNvPr id="7" name="Straight Arrow Connector 6">
-            <a:extLst>
-              <a:ext uri="{FF2B5EF4-FFF2-40B4-BE49-F238E27FC236}">
-                <a16:creationId xmlns:a16="http://schemas.microsoft.com/office/drawing/2014/main" id="{37417D7D-994A-42CB-AD50-8C6B9BD88D80}"/>
-              </a:ext>
-            </a:extLst>
-          </p:cNvPr>
-          <p:cNvCxnSpPr/>
-          <p:nvPr/>
-        </p:nvCxnSpPr>
-        <p:spPr>
-          <a:xfrm>
-            <a:off x="3566766" y="5274453"/>
-            <a:ext cx="423894" cy="496562"/>
-          </a:xfrm>
-          <a:prstGeom prst="straightConnector1">
-            <a:avLst/>
-          </a:prstGeom>
-          <a:ln>
-            <a:tailEnd type="triangle"/>
-          </a:ln>
-        </p:spPr>
-        <p:style>
-          <a:lnRef idx="1">
-            <a:schemeClr val="accent1"/>
-          </a:lnRef>
-          <a:fillRef idx="0">
-            <a:schemeClr val="accent1"/>
-          </a:fillRef>
-          <a:effectRef idx="0">
-            <a:schemeClr val="accent1"/>
-          </a:effectRef>
-          <a:fontRef idx="minor">
-            <a:schemeClr val="tx1"/>
-          </a:fontRef>
-        </p:style>
-      </p:cxnSp>
-      <p:sp>
-        <p:nvSpPr>
-          <p:cNvPr id="8" name="TextBox 7">
-            <a:extLst>
-              <a:ext uri="{FF2B5EF4-FFF2-40B4-BE49-F238E27FC236}">
-                <a16:creationId xmlns:a16="http://schemas.microsoft.com/office/drawing/2014/main" id="{B2BEED8F-7A63-4E2E-BF0B-1920D0B4FE25}"/>
+      <p:sp>
+        <p:nvSpPr>
+          <p:cNvPr id="5" name="TextBox 4">
+            <a:extLst>
+              <a:ext uri="{FF2B5EF4-FFF2-40B4-BE49-F238E27FC236}">
+                <a16:creationId xmlns:a16="http://schemas.microsoft.com/office/drawing/2014/main" id="{10B42199-DC88-4AB1-8A66-7149C7E5E5CB}"/>
               </a:ext>
             </a:extLst>
           </p:cNvPr>
@@ -6121,8 +6331,8 @@
         </p:nvSpPr>
         <p:spPr>
           <a:xfrm>
-            <a:off x="1786411" y="4705224"/>
-            <a:ext cx="1779013" cy="1200329"/>
+            <a:off x="9398336" y="551062"/>
+            <a:ext cx="2543197" cy="923330"/>
           </a:xfrm>
           <a:prstGeom prst="rect">
             <a:avLst/>
@@ -6137,46 +6347,27 @@
           <a:p>
             <a:r>
               <a:rPr lang="en-US" dirty="0"/>
-              <a:t>I am about to </a:t>
+              <a:t>Git log shows the </a:t>
             </a:r>
           </a:p>
           <a:p>
             <a:r>
               <a:rPr lang="en-US" dirty="0"/>
-              <a:t>push this lecture</a:t>
+              <a:t>entire history of commits</a:t>
             </a:r>
           </a:p>
           <a:p>
             <a:r>
               <a:rPr lang="en-US" dirty="0"/>
-              <a:t>to </a:t>
-            </a:r>
-            <a:r>
-              <a:rPr lang="en-US" dirty="0" err="1"/>
-              <a:t>github</a:t>
-            </a:r>
-            <a:r>
-              <a:rPr lang="en-US" dirty="0"/>
-              <a:t> via the </a:t>
-            </a:r>
-          </a:p>
-          <a:p>
-            <a:r>
-              <a:rPr lang="en-US" dirty="0"/>
-              <a:t>Eclipse </a:t>
-            </a:r>
-            <a:r>
-              <a:rPr lang="en-US" dirty="0" err="1"/>
-              <a:t>gui</a:t>
-            </a:r>
-            <a:endParaRPr lang="en-US" dirty="0"/>
+              <a:t>(both local and remote)</a:t>
+            </a:r>
           </a:p>
         </p:txBody>
       </p:sp>
     </p:spTree>
     <p:extLst>
       <p:ext uri="{BB962C8B-B14F-4D97-AF65-F5344CB8AC3E}">
-        <p14:creationId xmlns:p14="http://schemas.microsoft.com/office/powerpoint/2010/main" val="1095829786"/>
+        <p14:creationId xmlns:p14="http://schemas.microsoft.com/office/powerpoint/2010/main" val="2585424307"/>
       </p:ext>
     </p:extLst>
   </p:cSld>
@@ -6205,10 +6396,10 @@
       </p:grpSpPr>
       <p:sp>
         <p:nvSpPr>
-          <p:cNvPr id="2" name="TextBox 1">
-            <a:extLst>
-              <a:ext uri="{FF2B5EF4-FFF2-40B4-BE49-F238E27FC236}">
-                <a16:creationId xmlns:a16="http://schemas.microsoft.com/office/drawing/2014/main" id="{C0493607-CE29-4DFE-B2B6-7E1618AC7386}"/>
+          <p:cNvPr id="4" name="TextBox 3">
+            <a:extLst>
+              <a:ext uri="{FF2B5EF4-FFF2-40B4-BE49-F238E27FC236}">
+                <a16:creationId xmlns:a16="http://schemas.microsoft.com/office/drawing/2014/main" id="{26D7D82D-AE7E-4588-811F-BC5859601887}"/>
               </a:ext>
             </a:extLst>
           </p:cNvPr>
@@ -6217,8 +6408,8 @@
         </p:nvSpPr>
         <p:spPr>
           <a:xfrm>
-            <a:off x="993123" y="678230"/>
-            <a:ext cx="6554038" cy="923330"/>
+            <a:off x="799341" y="236167"/>
+            <a:ext cx="8879354" cy="1477328"/>
           </a:xfrm>
           <a:prstGeom prst="rect">
             <a:avLst/>
@@ -6236,7 +6427,243 @@
                 <a:latin typeface="Arial" panose="020B0604020202020204" pitchFamily="34" charset="0"/>
                 <a:cs typeface="Arial" panose="020B0604020202020204" pitchFamily="34" charset="0"/>
               </a:rPr>
-              <a:t>This week’s lab will give us all some practice dealing with git…</a:t>
+              <a:t>Eclipse will allow us to do a lot of these interactions via GUI, where in some ways it is</a:t>
+            </a:r>
+          </a:p>
+          <a:p>
+            <a:r>
+              <a:rPr lang="en-US" dirty="0">
+                <a:latin typeface="Arial" panose="020B0604020202020204" pitchFamily="34" charset="0"/>
+                <a:cs typeface="Arial" panose="020B0604020202020204" pitchFamily="34" charset="0"/>
+              </a:rPr>
+              <a:t>easier to see what is going on, but it is also easier to make a mistake.</a:t>
+            </a:r>
+          </a:p>
+          <a:p>
+            <a:endParaRPr lang="en-US" dirty="0">
+              <a:latin typeface="Arial" panose="020B0604020202020204" pitchFamily="34" charset="0"/>
+              <a:cs typeface="Arial" panose="020B0604020202020204" pitchFamily="34" charset="0"/>
+            </a:endParaRPr>
+          </a:p>
+          <a:p>
+            <a:r>
+              <a:rPr lang="en-US" dirty="0">
+                <a:latin typeface="Arial" panose="020B0604020202020204" pitchFamily="34" charset="0"/>
+                <a:cs typeface="Arial" panose="020B0604020202020204" pitchFamily="34" charset="0"/>
+              </a:rPr>
+              <a:t>Within the same repository, you can switch back and forth between Eclipse and the</a:t>
+            </a:r>
+          </a:p>
+          <a:p>
+            <a:r>
+              <a:rPr lang="en-US" dirty="0">
+                <a:latin typeface="Arial" panose="020B0604020202020204" pitchFamily="34" charset="0"/>
+                <a:cs typeface="Arial" panose="020B0604020202020204" pitchFamily="34" charset="0"/>
+              </a:rPr>
+              <a:t>command line (Eclipse just executes command line instructions).  </a:t>
+            </a:r>
+          </a:p>
+        </p:txBody>
+      </p:sp>
+      <p:pic>
+        <p:nvPicPr>
+          <p:cNvPr id="5" name="Picture 4">
+            <a:extLst>
+              <a:ext uri="{FF2B5EF4-FFF2-40B4-BE49-F238E27FC236}">
+                <a16:creationId xmlns:a16="http://schemas.microsoft.com/office/drawing/2014/main" id="{982A3B7A-C96F-4496-A8B8-B3866030C84F}"/>
+              </a:ext>
+            </a:extLst>
+          </p:cNvPr>
+          <p:cNvPicPr>
+            <a:picLocks noChangeAspect="1"/>
+          </p:cNvPicPr>
+          <p:nvPr/>
+        </p:nvPicPr>
+        <p:blipFill>
+          <a:blip r:embed="rId2"/>
+          <a:stretch>
+            <a:fillRect/>
+          </a:stretch>
+        </p:blipFill>
+        <p:spPr>
+          <a:xfrm>
+            <a:off x="3933450" y="1604742"/>
+            <a:ext cx="6276341" cy="4955945"/>
+          </a:xfrm>
+          <a:prstGeom prst="rect">
+            <a:avLst/>
+          </a:prstGeom>
+        </p:spPr>
+      </p:pic>
+      <p:cxnSp>
+        <p:nvCxnSpPr>
+          <p:cNvPr id="7" name="Straight Arrow Connector 6">
+            <a:extLst>
+              <a:ext uri="{FF2B5EF4-FFF2-40B4-BE49-F238E27FC236}">
+                <a16:creationId xmlns:a16="http://schemas.microsoft.com/office/drawing/2014/main" id="{37417D7D-994A-42CB-AD50-8C6B9BD88D80}"/>
+              </a:ext>
+            </a:extLst>
+          </p:cNvPr>
+          <p:cNvCxnSpPr/>
+          <p:nvPr/>
+        </p:nvCxnSpPr>
+        <p:spPr>
+          <a:xfrm>
+            <a:off x="3566766" y="5274453"/>
+            <a:ext cx="423894" cy="496562"/>
+          </a:xfrm>
+          <a:prstGeom prst="straightConnector1">
+            <a:avLst/>
+          </a:prstGeom>
+          <a:ln>
+            <a:tailEnd type="triangle"/>
+          </a:ln>
+        </p:spPr>
+        <p:style>
+          <a:lnRef idx="1">
+            <a:schemeClr val="accent1"/>
+          </a:lnRef>
+          <a:fillRef idx="0">
+            <a:schemeClr val="accent1"/>
+          </a:fillRef>
+          <a:effectRef idx="0">
+            <a:schemeClr val="accent1"/>
+          </a:effectRef>
+          <a:fontRef idx="minor">
+            <a:schemeClr val="tx1"/>
+          </a:fontRef>
+        </p:style>
+      </p:cxnSp>
+      <p:sp>
+        <p:nvSpPr>
+          <p:cNvPr id="8" name="TextBox 7">
+            <a:extLst>
+              <a:ext uri="{FF2B5EF4-FFF2-40B4-BE49-F238E27FC236}">
+                <a16:creationId xmlns:a16="http://schemas.microsoft.com/office/drawing/2014/main" id="{B2BEED8F-7A63-4E2E-BF0B-1920D0B4FE25}"/>
+              </a:ext>
+            </a:extLst>
+          </p:cNvPr>
+          <p:cNvSpPr txBox="1"/>
+          <p:nvPr/>
+        </p:nvSpPr>
+        <p:spPr>
+          <a:xfrm>
+            <a:off x="1786411" y="4705224"/>
+            <a:ext cx="1779013" cy="1200329"/>
+          </a:xfrm>
+          <a:prstGeom prst="rect">
+            <a:avLst/>
+          </a:prstGeom>
+          <a:noFill/>
+        </p:spPr>
+        <p:txBody>
+          <a:bodyPr wrap="none" rtlCol="0">
+            <a:spAutoFit/>
+          </a:bodyPr>
+          <a:lstStyle/>
+          <a:p>
+            <a:r>
+              <a:rPr lang="en-US" dirty="0"/>
+              <a:t>I am about to </a:t>
+            </a:r>
+          </a:p>
+          <a:p>
+            <a:r>
+              <a:rPr lang="en-US" dirty="0"/>
+              <a:t>push this lecture</a:t>
+            </a:r>
+          </a:p>
+          <a:p>
+            <a:r>
+              <a:rPr lang="en-US" dirty="0"/>
+              <a:t>to </a:t>
+            </a:r>
+            <a:r>
+              <a:rPr lang="en-US" dirty="0" err="1"/>
+              <a:t>github</a:t>
+            </a:r>
+            <a:r>
+              <a:rPr lang="en-US" dirty="0"/>
+              <a:t> via the </a:t>
+            </a:r>
+          </a:p>
+          <a:p>
+            <a:r>
+              <a:rPr lang="en-US" dirty="0"/>
+              <a:t>Eclipse </a:t>
+            </a:r>
+            <a:r>
+              <a:rPr lang="en-US" dirty="0" err="1"/>
+              <a:t>gui</a:t>
+            </a:r>
+            <a:endParaRPr lang="en-US" dirty="0"/>
+          </a:p>
+        </p:txBody>
+      </p:sp>
+    </p:spTree>
+    <p:extLst>
+      <p:ext uri="{BB962C8B-B14F-4D97-AF65-F5344CB8AC3E}">
+        <p14:creationId xmlns:p14="http://schemas.microsoft.com/office/powerpoint/2010/main" val="1095829786"/>
+      </p:ext>
+    </p:extLst>
+  </p:cSld>
+  <p:clrMapOvr>
+    <a:masterClrMapping/>
+  </p:clrMapOvr>
+</p:sld>
+</file>
+
+<file path=ppt/slides/slide27.xml><?xml version="1.0" encoding="utf-8"?>
+<p:sld xmlns:a="http://schemas.openxmlformats.org/drawingml/2006/main" xmlns:r="http://schemas.openxmlformats.org/officeDocument/2006/relationships" xmlns:p="http://schemas.openxmlformats.org/presentationml/2006/main">
+  <p:cSld>
+    <p:spTree>
+      <p:nvGrpSpPr>
+        <p:cNvPr id="1" name=""/>
+        <p:cNvGrpSpPr/>
+        <p:nvPr/>
+      </p:nvGrpSpPr>
+      <p:grpSpPr>
+        <a:xfrm>
+          <a:off x="0" y="0"/>
+          <a:ext cx="0" cy="0"/>
+          <a:chOff x="0" y="0"/>
+          <a:chExt cx="0" cy="0"/>
+        </a:xfrm>
+      </p:grpSpPr>
+      <p:sp>
+        <p:nvSpPr>
+          <p:cNvPr id="2" name="TextBox 1">
+            <a:extLst>
+              <a:ext uri="{FF2B5EF4-FFF2-40B4-BE49-F238E27FC236}">
+                <a16:creationId xmlns:a16="http://schemas.microsoft.com/office/drawing/2014/main" id="{C0493607-CE29-4DFE-B2B6-7E1618AC7386}"/>
+              </a:ext>
+            </a:extLst>
+          </p:cNvPr>
+          <p:cNvSpPr txBox="1"/>
+          <p:nvPr/>
+        </p:nvSpPr>
+        <p:spPr>
+          <a:xfrm>
+            <a:off x="993123" y="678230"/>
+            <a:ext cx="6250429" cy="923330"/>
+          </a:xfrm>
+          <a:prstGeom prst="rect">
+            <a:avLst/>
+          </a:prstGeom>
+          <a:noFill/>
+        </p:spPr>
+        <p:txBody>
+          <a:bodyPr wrap="none" rtlCol="0">
+            <a:spAutoFit/>
+          </a:bodyPr>
+          <a:lstStyle/>
+          <a:p>
+            <a:r>
+              <a:rPr lang="en-US" dirty="0">
+                <a:latin typeface="Arial" panose="020B0604020202020204" pitchFamily="34" charset="0"/>
+                <a:cs typeface="Arial" panose="020B0604020202020204" pitchFamily="34" charset="0"/>
+              </a:rPr>
+              <a:t>The next lab will give us all some practice dealing with git…</a:t>
             </a:r>
           </a:p>
           <a:p>

</xml_diff>